<commit_message>
Added the Powerpoint presentation slides
</commit_message>
<xml_diff>
--- a/The_Presentation.pptx
+++ b/The_Presentation.pptx
@@ -1,6 +1,6 @@
 
 <file path=ppt/presentation.xml><?xml version="1.0" encoding="utf-8"?>
-<p:presentation xmlns:a="http://schemas.openxmlformats.org/drawingml/2006/main" xmlns:r="http://schemas.openxmlformats.org/officeDocument/2006/relationships" xmlns:p="http://schemas.openxmlformats.org/presentationml/2006/main" saveSubsetFonts="1">
+<p:presentation xmlns:a="http://schemas.openxmlformats.org/drawingml/2006/main" xmlns:r="http://schemas.openxmlformats.org/officeDocument/2006/relationships" xmlns:p="http://schemas.openxmlformats.org/presentationml/2006/main" saveSubsetFonts="1" autoCompressPictures="0">
   <p:sldMasterIdLst>
     <p:sldMasterId id="2147483648" r:id="rId1"/>
   </p:sldMasterIdLst>
@@ -28,7 +28,11 @@
     <p:sldId id="276" r:id="rId22"/>
     <p:sldId id="277" r:id="rId23"/>
     <p:sldId id="278" r:id="rId24"/>
+    <p:sldId id="279" r:id="rId25"/>
   </p:sldIdLst>
+  <p:notesMasterIdLst>
+    <p:notesMasterId r:id="rId30"/>
+  </p:notesMasterIdLst>
   <p:sldSz cx="9144000" cy="5143500" type="screen16x9"/>
   <p:notesSz cx="5143500" cy="9144000"/>
   <p:defaultTextStyle>
@@ -123,16 +127,2473 @@
       </a:defRPr>
     </a:lvl9pPr>
   </p:defaultTextStyle>
-  <p:extLst>
-    <p:ext uri="{EFAFB233-063F-42B5-8137-9DF3F51BA10A}">
-      <p15:sldGuideLst xmlns:p15="http://schemas.microsoft.com/office/powerpoint/2012/main"/>
-    </p:ext>
-  </p:extLst>
 </p:presentation>
 </file>
 
+<file path=ppt/notesMasters/notesMaster1.xml><?xml version="1.0" encoding="utf-8"?>
+<p:notesMaster xmlns:a="http://schemas.openxmlformats.org/drawingml/2006/main" xmlns:r="http://schemas.openxmlformats.org/officeDocument/2006/relationships" xmlns:p="http://schemas.openxmlformats.org/presentationml/2006/main">
+  <p:cSld>
+    <p:bg>
+      <p:bgRef idx="1001">
+        <a:schemeClr val="bg1"/>
+      </p:bgRef>
+    </p:bg>
+    <p:spTree>
+      <p:nvGrpSpPr>
+        <p:cNvPr id="1" name=""/>
+        <p:cNvGrpSpPr/>
+        <p:nvPr/>
+      </p:nvGrpSpPr>
+      <p:grpSpPr>
+        <a:xfrm>
+          <a:off x="0" y="0"/>
+          <a:ext cx="0" cy="0"/>
+          <a:chOff x="0" y="0"/>
+          <a:chExt cx="0" cy="0"/>
+        </a:xfrm>
+      </p:grpSpPr>
+      <p:sp>
+        <p:nvSpPr>
+          <p:cNvPr id="2" name="Header Placeholder 1"/>
+          <p:cNvSpPr>
+            <a:spLocks noGrp="1"/>
+          </p:cNvSpPr>
+          <p:nvPr>
+            <p:ph type="hdr" sz="quarter"/>
+          </p:nvPr>
+        </p:nvSpPr>
+        <p:spPr>
+          <a:xfrm>
+            <a:off x="0" y="0"/>
+            <a:ext cx="2971800" cy="458788"/>
+          </a:xfrm>
+          <a:prstGeom prst="rect">
+            <a:avLst/>
+          </a:prstGeom>
+        </p:spPr>
+        <p:txBody>
+          <a:bodyPr vert="horz" lIns="91440" tIns="45720" rIns="91440" bIns="45720" rtlCol="0"/>
+          <a:lstStyle>
+            <a:lvl1pPr algn="l">
+              <a:defRPr sz="1200"/>
+            </a:lvl1pPr>
+          </a:lstStyle>
+          <a:p>
+            <a:endParaRPr lang="en-US"/>
+          </a:p>
+        </p:txBody>
+      </p:sp>
+      <p:sp>
+        <p:nvSpPr>
+          <p:cNvPr id="3" name="Date Placeholder 2"/>
+          <p:cNvSpPr>
+            <a:spLocks noGrp="1"/>
+          </p:cNvSpPr>
+          <p:nvPr>
+            <p:ph type="dt" idx="1"/>
+          </p:nvPr>
+        </p:nvSpPr>
+        <p:spPr>
+          <a:xfrm>
+            <a:off x="3884613" y="0"/>
+            <a:ext cx="2971800" cy="458788"/>
+          </a:xfrm>
+          <a:prstGeom prst="rect">
+            <a:avLst/>
+          </a:prstGeom>
+        </p:spPr>
+        <p:txBody>
+          <a:bodyPr vert="horz" lIns="91440" tIns="45720" rIns="91440" bIns="45720" rtlCol="0"/>
+          <a:lstStyle>
+            <a:lvl1pPr algn="r">
+              <a:defRPr sz="1200"/>
+            </a:lvl1pPr>
+          </a:lstStyle>
+          <a:p>
+            <a:fld id="{5282F153-3F37-0F45-9E97-73ACFA13230C}" type="datetimeFigureOut">
+              <a:rPr lang="en-US" smtClean="0"/>
+              <a:t>6/20/18</a:t>
+            </a:fld>
+            <a:endParaRPr lang="en-US"/>
+          </a:p>
+        </p:txBody>
+      </p:sp>
+      <p:sp>
+        <p:nvSpPr>
+          <p:cNvPr id="4" name="Slide Image Placeholder 3"/>
+          <p:cNvSpPr>
+            <a:spLocks noGrp="1" noRot="1" noChangeAspect="1"/>
+          </p:cNvSpPr>
+          <p:nvPr>
+            <p:ph type="sldImg" idx="2"/>
+          </p:nvPr>
+        </p:nvSpPr>
+        <p:spPr>
+          <a:xfrm>
+            <a:off x="685800" y="1143000"/>
+            <a:ext cx="5486400" cy="3086100"/>
+          </a:xfrm>
+          <a:prstGeom prst="rect">
+            <a:avLst/>
+          </a:prstGeom>
+          <a:noFill/>
+          <a:ln w="12700">
+            <a:solidFill>
+              <a:prstClr val="black"/>
+            </a:solidFill>
+          </a:ln>
+        </p:spPr>
+        <p:txBody>
+          <a:bodyPr vert="horz" lIns="91440" tIns="45720" rIns="91440" bIns="45720" rtlCol="0" anchor="ctr"/>
+          <a:lstStyle/>
+          <a:p>
+            <a:endParaRPr lang="en-US"/>
+          </a:p>
+        </p:txBody>
+      </p:sp>
+      <p:sp>
+        <p:nvSpPr>
+          <p:cNvPr id="5" name="Notes Placeholder 4"/>
+          <p:cNvSpPr>
+            <a:spLocks noGrp="1"/>
+          </p:cNvSpPr>
+          <p:nvPr>
+            <p:ph type="body" sz="quarter" idx="3"/>
+          </p:nvPr>
+        </p:nvSpPr>
+        <p:spPr>
+          <a:xfrm>
+            <a:off x="685800" y="4400550"/>
+            <a:ext cx="5486400" cy="3600450"/>
+          </a:xfrm>
+          <a:prstGeom prst="rect">
+            <a:avLst/>
+          </a:prstGeom>
+        </p:spPr>
+        <p:txBody>
+          <a:bodyPr vert="horz" lIns="91440" tIns="45720" rIns="91440" bIns="45720" rtlCol="0"/>
+          <a:lstStyle/>
+          <a:p>
+            <a:pPr lvl="0"/>
+            <a:r>
+              <a:rPr lang="en-US" smtClean="0"/>
+              <a:t>Click to edit Master text styles</a:t>
+            </a:r>
+          </a:p>
+          <a:p>
+            <a:pPr lvl="1"/>
+            <a:r>
+              <a:rPr lang="en-US" smtClean="0"/>
+              <a:t>Second level</a:t>
+            </a:r>
+          </a:p>
+          <a:p>
+            <a:pPr lvl="2"/>
+            <a:r>
+              <a:rPr lang="en-US" smtClean="0"/>
+              <a:t>Third level</a:t>
+            </a:r>
+          </a:p>
+          <a:p>
+            <a:pPr lvl="3"/>
+            <a:r>
+              <a:rPr lang="en-US" smtClean="0"/>
+              <a:t>Fourth level</a:t>
+            </a:r>
+          </a:p>
+          <a:p>
+            <a:pPr lvl="4"/>
+            <a:r>
+              <a:rPr lang="en-US" smtClean="0"/>
+              <a:t>Fifth level</a:t>
+            </a:r>
+            <a:endParaRPr lang="en-US"/>
+          </a:p>
+        </p:txBody>
+      </p:sp>
+      <p:sp>
+        <p:nvSpPr>
+          <p:cNvPr id="6" name="Footer Placeholder 5"/>
+          <p:cNvSpPr>
+            <a:spLocks noGrp="1"/>
+          </p:cNvSpPr>
+          <p:nvPr>
+            <p:ph type="ftr" sz="quarter" idx="4"/>
+          </p:nvPr>
+        </p:nvSpPr>
+        <p:spPr>
+          <a:xfrm>
+            <a:off x="0" y="8685213"/>
+            <a:ext cx="2971800" cy="458787"/>
+          </a:xfrm>
+          <a:prstGeom prst="rect">
+            <a:avLst/>
+          </a:prstGeom>
+        </p:spPr>
+        <p:txBody>
+          <a:bodyPr vert="horz" lIns="91440" tIns="45720" rIns="91440" bIns="45720" rtlCol="0" anchor="b"/>
+          <a:lstStyle>
+            <a:lvl1pPr algn="l">
+              <a:defRPr sz="1200"/>
+            </a:lvl1pPr>
+          </a:lstStyle>
+          <a:p>
+            <a:endParaRPr lang="en-US"/>
+          </a:p>
+        </p:txBody>
+      </p:sp>
+      <p:sp>
+        <p:nvSpPr>
+          <p:cNvPr id="7" name="Slide Number Placeholder 6"/>
+          <p:cNvSpPr>
+            <a:spLocks noGrp="1"/>
+          </p:cNvSpPr>
+          <p:nvPr>
+            <p:ph type="sldNum" sz="quarter" idx="5"/>
+          </p:nvPr>
+        </p:nvSpPr>
+        <p:spPr>
+          <a:xfrm>
+            <a:off x="3884613" y="8685213"/>
+            <a:ext cx="2971800" cy="458787"/>
+          </a:xfrm>
+          <a:prstGeom prst="rect">
+            <a:avLst/>
+          </a:prstGeom>
+        </p:spPr>
+        <p:txBody>
+          <a:bodyPr vert="horz" lIns="91440" tIns="45720" rIns="91440" bIns="45720" rtlCol="0" anchor="b"/>
+          <a:lstStyle>
+            <a:lvl1pPr algn="r">
+              <a:defRPr sz="1200"/>
+            </a:lvl1pPr>
+          </a:lstStyle>
+          <a:p>
+            <a:fld id="{CE5E9CC1-C706-0F49-92D6-E571CC5EEA8F}" type="slidenum">
+              <a:rPr lang="en-US" smtClean="0"/>
+              <a:t>‹#›</a:t>
+            </a:fld>
+            <a:endParaRPr lang="en-US"/>
+          </a:p>
+        </p:txBody>
+      </p:sp>
+    </p:spTree>
+    <p:extLst>
+      <p:ext uri="{BB962C8B-B14F-4D97-AF65-F5344CB8AC3E}">
+        <p14:creationId xmlns:p14="http://schemas.microsoft.com/office/powerpoint/2010/main" val="1024086991"/>
+      </p:ext>
+    </p:extLst>
+  </p:cSld>
+  <p:clrMap bg1="lt1" tx1="dk1" bg2="lt2" tx2="dk2" accent1="accent1" accent2="accent2" accent3="accent3" accent4="accent4" accent5="accent5" accent6="accent6" hlink="hlink" folHlink="folHlink"/>
+  <p:notesStyle>
+    <a:lvl1pPr marL="0" algn="l" defTabSz="914400" rtl="0" eaLnBrk="1" latinLnBrk="0" hangingPunct="1">
+      <a:defRPr sz="1200" kern="1200">
+        <a:solidFill>
+          <a:schemeClr val="tx1"/>
+        </a:solidFill>
+        <a:latin typeface="+mn-lt"/>
+        <a:ea typeface="+mn-ea"/>
+        <a:cs typeface="+mn-cs"/>
+      </a:defRPr>
+    </a:lvl1pPr>
+    <a:lvl2pPr marL="457200" algn="l" defTabSz="914400" rtl="0" eaLnBrk="1" latinLnBrk="0" hangingPunct="1">
+      <a:defRPr sz="1200" kern="1200">
+        <a:solidFill>
+          <a:schemeClr val="tx1"/>
+        </a:solidFill>
+        <a:latin typeface="+mn-lt"/>
+        <a:ea typeface="+mn-ea"/>
+        <a:cs typeface="+mn-cs"/>
+      </a:defRPr>
+    </a:lvl2pPr>
+    <a:lvl3pPr marL="914400" algn="l" defTabSz="914400" rtl="0" eaLnBrk="1" latinLnBrk="0" hangingPunct="1">
+      <a:defRPr sz="1200" kern="1200">
+        <a:solidFill>
+          <a:schemeClr val="tx1"/>
+        </a:solidFill>
+        <a:latin typeface="+mn-lt"/>
+        <a:ea typeface="+mn-ea"/>
+        <a:cs typeface="+mn-cs"/>
+      </a:defRPr>
+    </a:lvl3pPr>
+    <a:lvl4pPr marL="1371600" algn="l" defTabSz="914400" rtl="0" eaLnBrk="1" latinLnBrk="0" hangingPunct="1">
+      <a:defRPr sz="1200" kern="1200">
+        <a:solidFill>
+          <a:schemeClr val="tx1"/>
+        </a:solidFill>
+        <a:latin typeface="+mn-lt"/>
+        <a:ea typeface="+mn-ea"/>
+        <a:cs typeface="+mn-cs"/>
+      </a:defRPr>
+    </a:lvl4pPr>
+    <a:lvl5pPr marL="1828800" algn="l" defTabSz="914400" rtl="0" eaLnBrk="1" latinLnBrk="0" hangingPunct="1">
+      <a:defRPr sz="1200" kern="1200">
+        <a:solidFill>
+          <a:schemeClr val="tx1"/>
+        </a:solidFill>
+        <a:latin typeface="+mn-lt"/>
+        <a:ea typeface="+mn-ea"/>
+        <a:cs typeface="+mn-cs"/>
+      </a:defRPr>
+    </a:lvl5pPr>
+    <a:lvl6pPr marL="2286000" algn="l" defTabSz="914400" rtl="0" eaLnBrk="1" latinLnBrk="0" hangingPunct="1">
+      <a:defRPr sz="1200" kern="1200">
+        <a:solidFill>
+          <a:schemeClr val="tx1"/>
+        </a:solidFill>
+        <a:latin typeface="+mn-lt"/>
+        <a:ea typeface="+mn-ea"/>
+        <a:cs typeface="+mn-cs"/>
+      </a:defRPr>
+    </a:lvl6pPr>
+    <a:lvl7pPr marL="2743200" algn="l" defTabSz="914400" rtl="0" eaLnBrk="1" latinLnBrk="0" hangingPunct="1">
+      <a:defRPr sz="1200" kern="1200">
+        <a:solidFill>
+          <a:schemeClr val="tx1"/>
+        </a:solidFill>
+        <a:latin typeface="+mn-lt"/>
+        <a:ea typeface="+mn-ea"/>
+        <a:cs typeface="+mn-cs"/>
+      </a:defRPr>
+    </a:lvl7pPr>
+    <a:lvl8pPr marL="3200400" algn="l" defTabSz="914400" rtl="0" eaLnBrk="1" latinLnBrk="0" hangingPunct="1">
+      <a:defRPr sz="1200" kern="1200">
+        <a:solidFill>
+          <a:schemeClr val="tx1"/>
+        </a:solidFill>
+        <a:latin typeface="+mn-lt"/>
+        <a:ea typeface="+mn-ea"/>
+        <a:cs typeface="+mn-cs"/>
+      </a:defRPr>
+    </a:lvl8pPr>
+    <a:lvl9pPr marL="3657600" algn="l" defTabSz="914400" rtl="0" eaLnBrk="1" latinLnBrk="0" hangingPunct="1">
+      <a:defRPr sz="1200" kern="1200">
+        <a:solidFill>
+          <a:schemeClr val="tx1"/>
+        </a:solidFill>
+        <a:latin typeface="+mn-lt"/>
+        <a:ea typeface="+mn-ea"/>
+        <a:cs typeface="+mn-cs"/>
+      </a:defRPr>
+    </a:lvl9pPr>
+  </p:notesStyle>
+</p:notesMaster>
+</file>
+
+<file path=ppt/notesSlides/notesSlide1.xml><?xml version="1.0" encoding="utf-8"?>
+<p:notes xmlns:a="http://schemas.openxmlformats.org/drawingml/2006/main" xmlns:r="http://schemas.openxmlformats.org/officeDocument/2006/relationships" xmlns:p="http://schemas.openxmlformats.org/presentationml/2006/main">
+  <p:cSld>
+    <p:spTree>
+      <p:nvGrpSpPr>
+        <p:cNvPr id="1" name=""/>
+        <p:cNvGrpSpPr/>
+        <p:nvPr/>
+      </p:nvGrpSpPr>
+      <p:grpSpPr>
+        <a:xfrm>
+          <a:off x="0" y="0"/>
+          <a:ext cx="0" cy="0"/>
+          <a:chOff x="0" y="0"/>
+          <a:chExt cx="0" cy="0"/>
+        </a:xfrm>
+      </p:grpSpPr>
+      <p:sp>
+        <p:nvSpPr>
+          <p:cNvPr id="2" name="Slide Image Placeholder 1"/>
+          <p:cNvSpPr>
+            <a:spLocks noGrp="1" noRot="1" noChangeAspect="1"/>
+          </p:cNvSpPr>
+          <p:nvPr>
+            <p:ph type="sldImg"/>
+          </p:nvPr>
+        </p:nvSpPr>
+        <p:spPr/>
+      </p:sp>
+      <p:sp>
+        <p:nvSpPr>
+          <p:cNvPr id="3" name="Notes Placeholder 2"/>
+          <p:cNvSpPr>
+            <a:spLocks noGrp="1"/>
+          </p:cNvSpPr>
+          <p:nvPr>
+            <p:ph type="body" idx="1"/>
+          </p:nvPr>
+        </p:nvSpPr>
+        <p:spPr/>
+        <p:txBody>
+          <a:bodyPr/>
+          <a:lstStyle/>
+          <a:p>
+            <a:r>
+              <a:rPr lang="en-US" dirty="0" smtClean="0"/>
+              <a:t>null</a:t>
+            </a:r>
+            <a:endParaRPr lang="en-US" dirty="0"/>
+          </a:p>
+        </p:txBody>
+      </p:sp>
+      <p:sp>
+        <p:nvSpPr>
+          <p:cNvPr id="4" name="Slide Number Placeholder 3"/>
+          <p:cNvSpPr>
+            <a:spLocks noGrp="1"/>
+          </p:cNvSpPr>
+          <p:nvPr>
+            <p:ph type="sldNum" sz="quarter" idx="10"/>
+          </p:nvPr>
+        </p:nvSpPr>
+        <p:spPr/>
+        <p:txBody>
+          <a:bodyPr/>
+          <a:lstStyle/>
+          <a:p>
+            <a:fld id="{F7021451-1387-4CA6-816F-3879F97B5CBC}" type="slidenum">
+              <a:rPr lang="en-US" smtClean="0"/>
+              <a:t>1</a:t>
+            </a:fld>
+            <a:endParaRPr lang="en-US"/>
+          </a:p>
+        </p:txBody>
+      </p:sp>
+    </p:spTree>
+    <p:extLst>
+      <p:ext uri="{BB962C8B-B14F-4D97-AF65-F5344CB8AC3E}">
+        <p14:creationId xmlns:p14="http://schemas.microsoft.com/office/powerpoint/2010/main" val="1024086991"/>
+      </p:ext>
+    </p:extLst>
+  </p:cSld>
+  <p:clrMapOvr>
+    <a:masterClrMapping/>
+  </p:clrMapOvr>
+</p:notes>
+</file>
+
+<file path=ppt/notesSlides/notesSlide10.xml><?xml version="1.0" encoding="utf-8"?>
+<p:notes xmlns:a="http://schemas.openxmlformats.org/drawingml/2006/main" xmlns:r="http://schemas.openxmlformats.org/officeDocument/2006/relationships" xmlns:p="http://schemas.openxmlformats.org/presentationml/2006/main">
+  <p:cSld>
+    <p:spTree>
+      <p:nvGrpSpPr>
+        <p:cNvPr id="1" name=""/>
+        <p:cNvGrpSpPr/>
+        <p:nvPr/>
+      </p:nvGrpSpPr>
+      <p:grpSpPr>
+        <a:xfrm>
+          <a:off x="0" y="0"/>
+          <a:ext cx="0" cy="0"/>
+          <a:chOff x="0" y="0"/>
+          <a:chExt cx="0" cy="0"/>
+        </a:xfrm>
+      </p:grpSpPr>
+      <p:sp>
+        <p:nvSpPr>
+          <p:cNvPr id="2" name="Slide Image Placeholder 1"/>
+          <p:cNvSpPr>
+            <a:spLocks noGrp="1" noRot="1" noChangeAspect="1"/>
+          </p:cNvSpPr>
+          <p:nvPr>
+            <p:ph type="sldImg"/>
+          </p:nvPr>
+        </p:nvSpPr>
+        <p:spPr/>
+      </p:sp>
+      <p:sp>
+        <p:nvSpPr>
+          <p:cNvPr id="3" name="Notes Placeholder 2"/>
+          <p:cNvSpPr>
+            <a:spLocks noGrp="1"/>
+          </p:cNvSpPr>
+          <p:nvPr>
+            <p:ph type="body" idx="1"/>
+          </p:nvPr>
+        </p:nvSpPr>
+        <p:spPr/>
+        <p:txBody>
+          <a:bodyPr/>
+          <a:lstStyle/>
+          <a:p>
+            <a:r>
+              <a:rPr lang="en-US" dirty="0" smtClean="0"/>
+              <a:t>null</a:t>
+            </a:r>
+            <a:endParaRPr lang="en-US" dirty="0"/>
+          </a:p>
+        </p:txBody>
+      </p:sp>
+      <p:sp>
+        <p:nvSpPr>
+          <p:cNvPr id="4" name="Slide Number Placeholder 3"/>
+          <p:cNvSpPr>
+            <a:spLocks noGrp="1"/>
+          </p:cNvSpPr>
+          <p:nvPr>
+            <p:ph type="sldNum" sz="quarter" idx="10"/>
+          </p:nvPr>
+        </p:nvSpPr>
+        <p:spPr/>
+        <p:txBody>
+          <a:bodyPr/>
+          <a:lstStyle/>
+          <a:p>
+            <a:fld id="{F7021451-1387-4CA6-816F-3879F97B5CBC}" type="slidenum">
+              <a:rPr lang="en-US" smtClean="0"/>
+              <a:t>10</a:t>
+            </a:fld>
+            <a:endParaRPr lang="en-US"/>
+          </a:p>
+        </p:txBody>
+      </p:sp>
+    </p:spTree>
+    <p:extLst>
+      <p:ext uri="{BB962C8B-B14F-4D97-AF65-F5344CB8AC3E}">
+        <p14:creationId xmlns:p14="http://schemas.microsoft.com/office/powerpoint/2010/main" val="1024086991"/>
+      </p:ext>
+    </p:extLst>
+  </p:cSld>
+  <p:clrMapOvr>
+    <a:masterClrMapping/>
+  </p:clrMapOvr>
+</p:notes>
+</file>
+
+<file path=ppt/notesSlides/notesSlide11.xml><?xml version="1.0" encoding="utf-8"?>
+<p:notes xmlns:a="http://schemas.openxmlformats.org/drawingml/2006/main" xmlns:r="http://schemas.openxmlformats.org/officeDocument/2006/relationships" xmlns:p="http://schemas.openxmlformats.org/presentationml/2006/main">
+  <p:cSld>
+    <p:spTree>
+      <p:nvGrpSpPr>
+        <p:cNvPr id="1" name=""/>
+        <p:cNvGrpSpPr/>
+        <p:nvPr/>
+      </p:nvGrpSpPr>
+      <p:grpSpPr>
+        <a:xfrm>
+          <a:off x="0" y="0"/>
+          <a:ext cx="0" cy="0"/>
+          <a:chOff x="0" y="0"/>
+          <a:chExt cx="0" cy="0"/>
+        </a:xfrm>
+      </p:grpSpPr>
+      <p:sp>
+        <p:nvSpPr>
+          <p:cNvPr id="2" name="Slide Image Placeholder 1"/>
+          <p:cNvSpPr>
+            <a:spLocks noGrp="1" noRot="1" noChangeAspect="1"/>
+          </p:cNvSpPr>
+          <p:nvPr>
+            <p:ph type="sldImg"/>
+          </p:nvPr>
+        </p:nvSpPr>
+        <p:spPr/>
+      </p:sp>
+      <p:sp>
+        <p:nvSpPr>
+          <p:cNvPr id="3" name="Notes Placeholder 2"/>
+          <p:cNvSpPr>
+            <a:spLocks noGrp="1"/>
+          </p:cNvSpPr>
+          <p:nvPr>
+            <p:ph type="body" idx="1"/>
+          </p:nvPr>
+        </p:nvSpPr>
+        <p:spPr/>
+        <p:txBody>
+          <a:bodyPr/>
+          <a:lstStyle/>
+          <a:p>
+            <a:r>
+              <a:rPr lang="en-US" dirty="0" smtClean="0"/>
+              <a:t>null</a:t>
+            </a:r>
+            <a:endParaRPr lang="en-US" dirty="0"/>
+          </a:p>
+        </p:txBody>
+      </p:sp>
+      <p:sp>
+        <p:nvSpPr>
+          <p:cNvPr id="4" name="Slide Number Placeholder 3"/>
+          <p:cNvSpPr>
+            <a:spLocks noGrp="1"/>
+          </p:cNvSpPr>
+          <p:nvPr>
+            <p:ph type="sldNum" sz="quarter" idx="10"/>
+          </p:nvPr>
+        </p:nvSpPr>
+        <p:spPr/>
+        <p:txBody>
+          <a:bodyPr/>
+          <a:lstStyle/>
+          <a:p>
+            <a:fld id="{F7021451-1387-4CA6-816F-3879F97B5CBC}" type="slidenum">
+              <a:rPr lang="en-US" smtClean="0"/>
+              <a:t>11</a:t>
+            </a:fld>
+            <a:endParaRPr lang="en-US"/>
+          </a:p>
+        </p:txBody>
+      </p:sp>
+    </p:spTree>
+    <p:extLst>
+      <p:ext uri="{BB962C8B-B14F-4D97-AF65-F5344CB8AC3E}">
+        <p14:creationId xmlns:p14="http://schemas.microsoft.com/office/powerpoint/2010/main" val="1024086991"/>
+      </p:ext>
+    </p:extLst>
+  </p:cSld>
+  <p:clrMapOvr>
+    <a:masterClrMapping/>
+  </p:clrMapOvr>
+</p:notes>
+</file>
+
+<file path=ppt/notesSlides/notesSlide12.xml><?xml version="1.0" encoding="utf-8"?>
+<p:notes xmlns:a="http://schemas.openxmlformats.org/drawingml/2006/main" xmlns:r="http://schemas.openxmlformats.org/officeDocument/2006/relationships" xmlns:p="http://schemas.openxmlformats.org/presentationml/2006/main">
+  <p:cSld>
+    <p:spTree>
+      <p:nvGrpSpPr>
+        <p:cNvPr id="1" name=""/>
+        <p:cNvGrpSpPr/>
+        <p:nvPr/>
+      </p:nvGrpSpPr>
+      <p:grpSpPr>
+        <a:xfrm>
+          <a:off x="0" y="0"/>
+          <a:ext cx="0" cy="0"/>
+          <a:chOff x="0" y="0"/>
+          <a:chExt cx="0" cy="0"/>
+        </a:xfrm>
+      </p:grpSpPr>
+      <p:sp>
+        <p:nvSpPr>
+          <p:cNvPr id="2" name="Slide Image Placeholder 1"/>
+          <p:cNvSpPr>
+            <a:spLocks noGrp="1" noRot="1" noChangeAspect="1"/>
+          </p:cNvSpPr>
+          <p:nvPr>
+            <p:ph type="sldImg"/>
+          </p:nvPr>
+        </p:nvSpPr>
+        <p:spPr/>
+      </p:sp>
+      <p:sp>
+        <p:nvSpPr>
+          <p:cNvPr id="3" name="Notes Placeholder 2"/>
+          <p:cNvSpPr>
+            <a:spLocks noGrp="1"/>
+          </p:cNvSpPr>
+          <p:nvPr>
+            <p:ph type="body" idx="1"/>
+          </p:nvPr>
+        </p:nvSpPr>
+        <p:spPr/>
+        <p:txBody>
+          <a:bodyPr/>
+          <a:lstStyle/>
+          <a:p>
+            <a:r>
+              <a:rPr lang="en-US" dirty="0" smtClean="0"/>
+              <a:t>null</a:t>
+            </a:r>
+            <a:endParaRPr lang="en-US" dirty="0"/>
+          </a:p>
+        </p:txBody>
+      </p:sp>
+      <p:sp>
+        <p:nvSpPr>
+          <p:cNvPr id="4" name="Slide Number Placeholder 3"/>
+          <p:cNvSpPr>
+            <a:spLocks noGrp="1"/>
+          </p:cNvSpPr>
+          <p:nvPr>
+            <p:ph type="sldNum" sz="quarter" idx="10"/>
+          </p:nvPr>
+        </p:nvSpPr>
+        <p:spPr/>
+        <p:txBody>
+          <a:bodyPr/>
+          <a:lstStyle/>
+          <a:p>
+            <a:fld id="{F7021451-1387-4CA6-816F-3879F97B5CBC}" type="slidenum">
+              <a:rPr lang="en-US" smtClean="0"/>
+              <a:t>12</a:t>
+            </a:fld>
+            <a:endParaRPr lang="en-US"/>
+          </a:p>
+        </p:txBody>
+      </p:sp>
+    </p:spTree>
+    <p:extLst>
+      <p:ext uri="{BB962C8B-B14F-4D97-AF65-F5344CB8AC3E}">
+        <p14:creationId xmlns:p14="http://schemas.microsoft.com/office/powerpoint/2010/main" val="1024086991"/>
+      </p:ext>
+    </p:extLst>
+  </p:cSld>
+  <p:clrMapOvr>
+    <a:masterClrMapping/>
+  </p:clrMapOvr>
+</p:notes>
+</file>
+
+<file path=ppt/notesSlides/notesSlide13.xml><?xml version="1.0" encoding="utf-8"?>
+<p:notes xmlns:a="http://schemas.openxmlformats.org/drawingml/2006/main" xmlns:r="http://schemas.openxmlformats.org/officeDocument/2006/relationships" xmlns:p="http://schemas.openxmlformats.org/presentationml/2006/main">
+  <p:cSld>
+    <p:spTree>
+      <p:nvGrpSpPr>
+        <p:cNvPr id="1" name=""/>
+        <p:cNvGrpSpPr/>
+        <p:nvPr/>
+      </p:nvGrpSpPr>
+      <p:grpSpPr>
+        <a:xfrm>
+          <a:off x="0" y="0"/>
+          <a:ext cx="0" cy="0"/>
+          <a:chOff x="0" y="0"/>
+          <a:chExt cx="0" cy="0"/>
+        </a:xfrm>
+      </p:grpSpPr>
+      <p:sp>
+        <p:nvSpPr>
+          <p:cNvPr id="2" name="Slide Image Placeholder 1"/>
+          <p:cNvSpPr>
+            <a:spLocks noGrp="1" noRot="1" noChangeAspect="1"/>
+          </p:cNvSpPr>
+          <p:nvPr>
+            <p:ph type="sldImg"/>
+          </p:nvPr>
+        </p:nvSpPr>
+        <p:spPr/>
+      </p:sp>
+      <p:sp>
+        <p:nvSpPr>
+          <p:cNvPr id="3" name="Notes Placeholder 2"/>
+          <p:cNvSpPr>
+            <a:spLocks noGrp="1"/>
+          </p:cNvSpPr>
+          <p:nvPr>
+            <p:ph type="body" idx="1"/>
+          </p:nvPr>
+        </p:nvSpPr>
+        <p:spPr/>
+        <p:txBody>
+          <a:bodyPr/>
+          <a:lstStyle/>
+          <a:p>
+            <a:r>
+              <a:rPr lang="en-US" dirty="0" smtClean="0"/>
+              <a:t>null</a:t>
+            </a:r>
+            <a:endParaRPr lang="en-US" dirty="0"/>
+          </a:p>
+        </p:txBody>
+      </p:sp>
+      <p:sp>
+        <p:nvSpPr>
+          <p:cNvPr id="4" name="Slide Number Placeholder 3"/>
+          <p:cNvSpPr>
+            <a:spLocks noGrp="1"/>
+          </p:cNvSpPr>
+          <p:nvPr>
+            <p:ph type="sldNum" sz="quarter" idx="10"/>
+          </p:nvPr>
+        </p:nvSpPr>
+        <p:spPr/>
+        <p:txBody>
+          <a:bodyPr/>
+          <a:lstStyle/>
+          <a:p>
+            <a:fld id="{F7021451-1387-4CA6-816F-3879F97B5CBC}" type="slidenum">
+              <a:rPr lang="en-US" smtClean="0"/>
+              <a:t>13</a:t>
+            </a:fld>
+            <a:endParaRPr lang="en-US"/>
+          </a:p>
+        </p:txBody>
+      </p:sp>
+    </p:spTree>
+    <p:extLst>
+      <p:ext uri="{BB962C8B-B14F-4D97-AF65-F5344CB8AC3E}">
+        <p14:creationId xmlns:p14="http://schemas.microsoft.com/office/powerpoint/2010/main" val="1024086991"/>
+      </p:ext>
+    </p:extLst>
+  </p:cSld>
+  <p:clrMapOvr>
+    <a:masterClrMapping/>
+  </p:clrMapOvr>
+</p:notes>
+</file>
+
+<file path=ppt/notesSlides/notesSlide14.xml><?xml version="1.0" encoding="utf-8"?>
+<p:notes xmlns:a="http://schemas.openxmlformats.org/drawingml/2006/main" xmlns:r="http://schemas.openxmlformats.org/officeDocument/2006/relationships" xmlns:p="http://schemas.openxmlformats.org/presentationml/2006/main">
+  <p:cSld>
+    <p:spTree>
+      <p:nvGrpSpPr>
+        <p:cNvPr id="1" name=""/>
+        <p:cNvGrpSpPr/>
+        <p:nvPr/>
+      </p:nvGrpSpPr>
+      <p:grpSpPr>
+        <a:xfrm>
+          <a:off x="0" y="0"/>
+          <a:ext cx="0" cy="0"/>
+          <a:chOff x="0" y="0"/>
+          <a:chExt cx="0" cy="0"/>
+        </a:xfrm>
+      </p:grpSpPr>
+      <p:sp>
+        <p:nvSpPr>
+          <p:cNvPr id="2" name="Slide Image Placeholder 1"/>
+          <p:cNvSpPr>
+            <a:spLocks noGrp="1" noRot="1" noChangeAspect="1"/>
+          </p:cNvSpPr>
+          <p:nvPr>
+            <p:ph type="sldImg"/>
+          </p:nvPr>
+        </p:nvSpPr>
+        <p:spPr/>
+      </p:sp>
+      <p:sp>
+        <p:nvSpPr>
+          <p:cNvPr id="3" name="Notes Placeholder 2"/>
+          <p:cNvSpPr>
+            <a:spLocks noGrp="1"/>
+          </p:cNvSpPr>
+          <p:nvPr>
+            <p:ph type="body" idx="1"/>
+          </p:nvPr>
+        </p:nvSpPr>
+        <p:spPr/>
+        <p:txBody>
+          <a:bodyPr/>
+          <a:lstStyle/>
+          <a:p>
+            <a:r>
+              <a:rPr lang="en-US" dirty="0" smtClean="0"/>
+              <a:t>null</a:t>
+            </a:r>
+            <a:endParaRPr lang="en-US" dirty="0"/>
+          </a:p>
+        </p:txBody>
+      </p:sp>
+      <p:sp>
+        <p:nvSpPr>
+          <p:cNvPr id="4" name="Slide Number Placeholder 3"/>
+          <p:cNvSpPr>
+            <a:spLocks noGrp="1"/>
+          </p:cNvSpPr>
+          <p:nvPr>
+            <p:ph type="sldNum" sz="quarter" idx="10"/>
+          </p:nvPr>
+        </p:nvSpPr>
+        <p:spPr/>
+        <p:txBody>
+          <a:bodyPr/>
+          <a:lstStyle/>
+          <a:p>
+            <a:fld id="{F7021451-1387-4CA6-816F-3879F97B5CBC}" type="slidenum">
+              <a:rPr lang="en-US" smtClean="0"/>
+              <a:t>14</a:t>
+            </a:fld>
+            <a:endParaRPr lang="en-US"/>
+          </a:p>
+        </p:txBody>
+      </p:sp>
+    </p:spTree>
+    <p:extLst>
+      <p:ext uri="{BB962C8B-B14F-4D97-AF65-F5344CB8AC3E}">
+        <p14:creationId xmlns:p14="http://schemas.microsoft.com/office/powerpoint/2010/main" val="1024086991"/>
+      </p:ext>
+    </p:extLst>
+  </p:cSld>
+  <p:clrMapOvr>
+    <a:masterClrMapping/>
+  </p:clrMapOvr>
+</p:notes>
+</file>
+
+<file path=ppt/notesSlides/notesSlide15.xml><?xml version="1.0" encoding="utf-8"?>
+<p:notes xmlns:a="http://schemas.openxmlformats.org/drawingml/2006/main" xmlns:r="http://schemas.openxmlformats.org/officeDocument/2006/relationships" xmlns:p="http://schemas.openxmlformats.org/presentationml/2006/main">
+  <p:cSld>
+    <p:spTree>
+      <p:nvGrpSpPr>
+        <p:cNvPr id="1" name=""/>
+        <p:cNvGrpSpPr/>
+        <p:nvPr/>
+      </p:nvGrpSpPr>
+      <p:grpSpPr>
+        <a:xfrm>
+          <a:off x="0" y="0"/>
+          <a:ext cx="0" cy="0"/>
+          <a:chOff x="0" y="0"/>
+          <a:chExt cx="0" cy="0"/>
+        </a:xfrm>
+      </p:grpSpPr>
+      <p:sp>
+        <p:nvSpPr>
+          <p:cNvPr id="2" name="Slide Image Placeholder 1"/>
+          <p:cNvSpPr>
+            <a:spLocks noGrp="1" noRot="1" noChangeAspect="1"/>
+          </p:cNvSpPr>
+          <p:nvPr>
+            <p:ph type="sldImg"/>
+          </p:nvPr>
+        </p:nvSpPr>
+        <p:spPr/>
+      </p:sp>
+      <p:sp>
+        <p:nvSpPr>
+          <p:cNvPr id="3" name="Notes Placeholder 2"/>
+          <p:cNvSpPr>
+            <a:spLocks noGrp="1"/>
+          </p:cNvSpPr>
+          <p:nvPr>
+            <p:ph type="body" idx="1"/>
+          </p:nvPr>
+        </p:nvSpPr>
+        <p:spPr/>
+        <p:txBody>
+          <a:bodyPr/>
+          <a:lstStyle/>
+          <a:p>
+            <a:r>
+              <a:rPr lang="en-US" dirty="0" smtClean="0"/>
+              <a:t>null</a:t>
+            </a:r>
+            <a:endParaRPr lang="en-US" dirty="0"/>
+          </a:p>
+        </p:txBody>
+      </p:sp>
+      <p:sp>
+        <p:nvSpPr>
+          <p:cNvPr id="4" name="Slide Number Placeholder 3"/>
+          <p:cNvSpPr>
+            <a:spLocks noGrp="1"/>
+          </p:cNvSpPr>
+          <p:nvPr>
+            <p:ph type="sldNum" sz="quarter" idx="10"/>
+          </p:nvPr>
+        </p:nvSpPr>
+        <p:spPr/>
+        <p:txBody>
+          <a:bodyPr/>
+          <a:lstStyle/>
+          <a:p>
+            <a:fld id="{F7021451-1387-4CA6-816F-3879F97B5CBC}" type="slidenum">
+              <a:rPr lang="en-US" smtClean="0"/>
+              <a:t>15</a:t>
+            </a:fld>
+            <a:endParaRPr lang="en-US"/>
+          </a:p>
+        </p:txBody>
+      </p:sp>
+    </p:spTree>
+    <p:extLst>
+      <p:ext uri="{BB962C8B-B14F-4D97-AF65-F5344CB8AC3E}">
+        <p14:creationId xmlns:p14="http://schemas.microsoft.com/office/powerpoint/2010/main" val="1024086991"/>
+      </p:ext>
+    </p:extLst>
+  </p:cSld>
+  <p:clrMapOvr>
+    <a:masterClrMapping/>
+  </p:clrMapOvr>
+</p:notes>
+</file>
+
+<file path=ppt/notesSlides/notesSlide16.xml><?xml version="1.0" encoding="utf-8"?>
+<p:notes xmlns:a="http://schemas.openxmlformats.org/drawingml/2006/main" xmlns:r="http://schemas.openxmlformats.org/officeDocument/2006/relationships" xmlns:p="http://schemas.openxmlformats.org/presentationml/2006/main">
+  <p:cSld>
+    <p:spTree>
+      <p:nvGrpSpPr>
+        <p:cNvPr id="1" name=""/>
+        <p:cNvGrpSpPr/>
+        <p:nvPr/>
+      </p:nvGrpSpPr>
+      <p:grpSpPr>
+        <a:xfrm>
+          <a:off x="0" y="0"/>
+          <a:ext cx="0" cy="0"/>
+          <a:chOff x="0" y="0"/>
+          <a:chExt cx="0" cy="0"/>
+        </a:xfrm>
+      </p:grpSpPr>
+      <p:sp>
+        <p:nvSpPr>
+          <p:cNvPr id="2" name="Slide Image Placeholder 1"/>
+          <p:cNvSpPr>
+            <a:spLocks noGrp="1" noRot="1" noChangeAspect="1"/>
+          </p:cNvSpPr>
+          <p:nvPr>
+            <p:ph type="sldImg"/>
+          </p:nvPr>
+        </p:nvSpPr>
+        <p:spPr/>
+      </p:sp>
+      <p:sp>
+        <p:nvSpPr>
+          <p:cNvPr id="3" name="Notes Placeholder 2"/>
+          <p:cNvSpPr>
+            <a:spLocks noGrp="1"/>
+          </p:cNvSpPr>
+          <p:nvPr>
+            <p:ph type="body" idx="1"/>
+          </p:nvPr>
+        </p:nvSpPr>
+        <p:spPr/>
+        <p:txBody>
+          <a:bodyPr/>
+          <a:lstStyle/>
+          <a:p>
+            <a:r>
+              <a:rPr lang="en-US" dirty="0" smtClean="0"/>
+              <a:t>null</a:t>
+            </a:r>
+            <a:endParaRPr lang="en-US" dirty="0"/>
+          </a:p>
+        </p:txBody>
+      </p:sp>
+      <p:sp>
+        <p:nvSpPr>
+          <p:cNvPr id="4" name="Slide Number Placeholder 3"/>
+          <p:cNvSpPr>
+            <a:spLocks noGrp="1"/>
+          </p:cNvSpPr>
+          <p:nvPr>
+            <p:ph type="sldNum" sz="quarter" idx="10"/>
+          </p:nvPr>
+        </p:nvSpPr>
+        <p:spPr/>
+        <p:txBody>
+          <a:bodyPr/>
+          <a:lstStyle/>
+          <a:p>
+            <a:fld id="{F7021451-1387-4CA6-816F-3879F97B5CBC}" type="slidenum">
+              <a:rPr lang="en-US" smtClean="0"/>
+              <a:t>16</a:t>
+            </a:fld>
+            <a:endParaRPr lang="en-US"/>
+          </a:p>
+        </p:txBody>
+      </p:sp>
+    </p:spTree>
+    <p:extLst>
+      <p:ext uri="{BB962C8B-B14F-4D97-AF65-F5344CB8AC3E}">
+        <p14:creationId xmlns:p14="http://schemas.microsoft.com/office/powerpoint/2010/main" val="1024086991"/>
+      </p:ext>
+    </p:extLst>
+  </p:cSld>
+  <p:clrMapOvr>
+    <a:masterClrMapping/>
+  </p:clrMapOvr>
+</p:notes>
+</file>
+
+<file path=ppt/notesSlides/notesSlide17.xml><?xml version="1.0" encoding="utf-8"?>
+<p:notes xmlns:a="http://schemas.openxmlformats.org/drawingml/2006/main" xmlns:r="http://schemas.openxmlformats.org/officeDocument/2006/relationships" xmlns:p="http://schemas.openxmlformats.org/presentationml/2006/main">
+  <p:cSld>
+    <p:spTree>
+      <p:nvGrpSpPr>
+        <p:cNvPr id="1" name=""/>
+        <p:cNvGrpSpPr/>
+        <p:nvPr/>
+      </p:nvGrpSpPr>
+      <p:grpSpPr>
+        <a:xfrm>
+          <a:off x="0" y="0"/>
+          <a:ext cx="0" cy="0"/>
+          <a:chOff x="0" y="0"/>
+          <a:chExt cx="0" cy="0"/>
+        </a:xfrm>
+      </p:grpSpPr>
+      <p:sp>
+        <p:nvSpPr>
+          <p:cNvPr id="2" name="Slide Image Placeholder 1"/>
+          <p:cNvSpPr>
+            <a:spLocks noGrp="1" noRot="1" noChangeAspect="1"/>
+          </p:cNvSpPr>
+          <p:nvPr>
+            <p:ph type="sldImg"/>
+          </p:nvPr>
+        </p:nvSpPr>
+        <p:spPr/>
+      </p:sp>
+      <p:sp>
+        <p:nvSpPr>
+          <p:cNvPr id="3" name="Notes Placeholder 2"/>
+          <p:cNvSpPr>
+            <a:spLocks noGrp="1"/>
+          </p:cNvSpPr>
+          <p:nvPr>
+            <p:ph type="body" idx="1"/>
+          </p:nvPr>
+        </p:nvSpPr>
+        <p:spPr/>
+        <p:txBody>
+          <a:bodyPr/>
+          <a:lstStyle/>
+          <a:p>
+            <a:r>
+              <a:rPr lang="en-US" dirty="0" smtClean="0"/>
+              <a:t>null</a:t>
+            </a:r>
+            <a:endParaRPr lang="en-US" dirty="0"/>
+          </a:p>
+        </p:txBody>
+      </p:sp>
+      <p:sp>
+        <p:nvSpPr>
+          <p:cNvPr id="4" name="Slide Number Placeholder 3"/>
+          <p:cNvSpPr>
+            <a:spLocks noGrp="1"/>
+          </p:cNvSpPr>
+          <p:nvPr>
+            <p:ph type="sldNum" sz="quarter" idx="10"/>
+          </p:nvPr>
+        </p:nvSpPr>
+        <p:spPr/>
+        <p:txBody>
+          <a:bodyPr/>
+          <a:lstStyle/>
+          <a:p>
+            <a:fld id="{F7021451-1387-4CA6-816F-3879F97B5CBC}" type="slidenum">
+              <a:rPr lang="en-US" smtClean="0"/>
+              <a:t>17</a:t>
+            </a:fld>
+            <a:endParaRPr lang="en-US"/>
+          </a:p>
+        </p:txBody>
+      </p:sp>
+    </p:spTree>
+    <p:extLst>
+      <p:ext uri="{BB962C8B-B14F-4D97-AF65-F5344CB8AC3E}">
+        <p14:creationId xmlns:p14="http://schemas.microsoft.com/office/powerpoint/2010/main" val="1024086991"/>
+      </p:ext>
+    </p:extLst>
+  </p:cSld>
+  <p:clrMapOvr>
+    <a:masterClrMapping/>
+  </p:clrMapOvr>
+</p:notes>
+</file>
+
+<file path=ppt/notesSlides/notesSlide18.xml><?xml version="1.0" encoding="utf-8"?>
+<p:notes xmlns:a="http://schemas.openxmlformats.org/drawingml/2006/main" xmlns:r="http://schemas.openxmlformats.org/officeDocument/2006/relationships" xmlns:p="http://schemas.openxmlformats.org/presentationml/2006/main">
+  <p:cSld>
+    <p:spTree>
+      <p:nvGrpSpPr>
+        <p:cNvPr id="1" name=""/>
+        <p:cNvGrpSpPr/>
+        <p:nvPr/>
+      </p:nvGrpSpPr>
+      <p:grpSpPr>
+        <a:xfrm>
+          <a:off x="0" y="0"/>
+          <a:ext cx="0" cy="0"/>
+          <a:chOff x="0" y="0"/>
+          <a:chExt cx="0" cy="0"/>
+        </a:xfrm>
+      </p:grpSpPr>
+      <p:sp>
+        <p:nvSpPr>
+          <p:cNvPr id="2" name="Slide Image Placeholder 1"/>
+          <p:cNvSpPr>
+            <a:spLocks noGrp="1" noRot="1" noChangeAspect="1"/>
+          </p:cNvSpPr>
+          <p:nvPr>
+            <p:ph type="sldImg"/>
+          </p:nvPr>
+        </p:nvSpPr>
+        <p:spPr/>
+      </p:sp>
+      <p:sp>
+        <p:nvSpPr>
+          <p:cNvPr id="3" name="Notes Placeholder 2"/>
+          <p:cNvSpPr>
+            <a:spLocks noGrp="1"/>
+          </p:cNvSpPr>
+          <p:nvPr>
+            <p:ph type="body" idx="1"/>
+          </p:nvPr>
+        </p:nvSpPr>
+        <p:spPr/>
+        <p:txBody>
+          <a:bodyPr/>
+          <a:lstStyle/>
+          <a:p>
+            <a:r>
+              <a:rPr lang="en-US" dirty="0" smtClean="0"/>
+              <a:t>null</a:t>
+            </a:r>
+            <a:endParaRPr lang="en-US" dirty="0"/>
+          </a:p>
+        </p:txBody>
+      </p:sp>
+      <p:sp>
+        <p:nvSpPr>
+          <p:cNvPr id="4" name="Slide Number Placeholder 3"/>
+          <p:cNvSpPr>
+            <a:spLocks noGrp="1"/>
+          </p:cNvSpPr>
+          <p:nvPr>
+            <p:ph type="sldNum" sz="quarter" idx="10"/>
+          </p:nvPr>
+        </p:nvSpPr>
+        <p:spPr/>
+        <p:txBody>
+          <a:bodyPr/>
+          <a:lstStyle/>
+          <a:p>
+            <a:fld id="{F7021451-1387-4CA6-816F-3879F97B5CBC}" type="slidenum">
+              <a:rPr lang="en-US" smtClean="0"/>
+              <a:t>18</a:t>
+            </a:fld>
+            <a:endParaRPr lang="en-US"/>
+          </a:p>
+        </p:txBody>
+      </p:sp>
+    </p:spTree>
+    <p:extLst>
+      <p:ext uri="{BB962C8B-B14F-4D97-AF65-F5344CB8AC3E}">
+        <p14:creationId xmlns:p14="http://schemas.microsoft.com/office/powerpoint/2010/main" val="1024086991"/>
+      </p:ext>
+    </p:extLst>
+  </p:cSld>
+  <p:clrMapOvr>
+    <a:masterClrMapping/>
+  </p:clrMapOvr>
+</p:notes>
+</file>
+
+<file path=ppt/notesSlides/notesSlide19.xml><?xml version="1.0" encoding="utf-8"?>
+<p:notes xmlns:a="http://schemas.openxmlformats.org/drawingml/2006/main" xmlns:r="http://schemas.openxmlformats.org/officeDocument/2006/relationships" xmlns:p="http://schemas.openxmlformats.org/presentationml/2006/main">
+  <p:cSld>
+    <p:spTree>
+      <p:nvGrpSpPr>
+        <p:cNvPr id="1" name=""/>
+        <p:cNvGrpSpPr/>
+        <p:nvPr/>
+      </p:nvGrpSpPr>
+      <p:grpSpPr>
+        <a:xfrm>
+          <a:off x="0" y="0"/>
+          <a:ext cx="0" cy="0"/>
+          <a:chOff x="0" y="0"/>
+          <a:chExt cx="0" cy="0"/>
+        </a:xfrm>
+      </p:grpSpPr>
+      <p:sp>
+        <p:nvSpPr>
+          <p:cNvPr id="2" name="Slide Image Placeholder 1"/>
+          <p:cNvSpPr>
+            <a:spLocks noGrp="1" noRot="1" noChangeAspect="1"/>
+          </p:cNvSpPr>
+          <p:nvPr>
+            <p:ph type="sldImg"/>
+          </p:nvPr>
+        </p:nvSpPr>
+        <p:spPr/>
+      </p:sp>
+      <p:sp>
+        <p:nvSpPr>
+          <p:cNvPr id="3" name="Notes Placeholder 2"/>
+          <p:cNvSpPr>
+            <a:spLocks noGrp="1"/>
+          </p:cNvSpPr>
+          <p:nvPr>
+            <p:ph type="body" idx="1"/>
+          </p:nvPr>
+        </p:nvSpPr>
+        <p:spPr/>
+        <p:txBody>
+          <a:bodyPr/>
+          <a:lstStyle/>
+          <a:p>
+            <a:r>
+              <a:rPr lang="en-US" dirty="0" smtClean="0"/>
+              <a:t>null</a:t>
+            </a:r>
+            <a:endParaRPr lang="en-US" dirty="0"/>
+          </a:p>
+        </p:txBody>
+      </p:sp>
+      <p:sp>
+        <p:nvSpPr>
+          <p:cNvPr id="4" name="Slide Number Placeholder 3"/>
+          <p:cNvSpPr>
+            <a:spLocks noGrp="1"/>
+          </p:cNvSpPr>
+          <p:nvPr>
+            <p:ph type="sldNum" sz="quarter" idx="10"/>
+          </p:nvPr>
+        </p:nvSpPr>
+        <p:spPr/>
+        <p:txBody>
+          <a:bodyPr/>
+          <a:lstStyle/>
+          <a:p>
+            <a:fld id="{F7021451-1387-4CA6-816F-3879F97B5CBC}" type="slidenum">
+              <a:rPr lang="en-US" smtClean="0"/>
+              <a:t>19</a:t>
+            </a:fld>
+            <a:endParaRPr lang="en-US"/>
+          </a:p>
+        </p:txBody>
+      </p:sp>
+    </p:spTree>
+    <p:extLst>
+      <p:ext uri="{BB962C8B-B14F-4D97-AF65-F5344CB8AC3E}">
+        <p14:creationId xmlns:p14="http://schemas.microsoft.com/office/powerpoint/2010/main" val="1024086991"/>
+      </p:ext>
+    </p:extLst>
+  </p:cSld>
+  <p:clrMapOvr>
+    <a:masterClrMapping/>
+  </p:clrMapOvr>
+</p:notes>
+</file>
+
+<file path=ppt/notesSlides/notesSlide2.xml><?xml version="1.0" encoding="utf-8"?>
+<p:notes xmlns:a="http://schemas.openxmlformats.org/drawingml/2006/main" xmlns:r="http://schemas.openxmlformats.org/officeDocument/2006/relationships" xmlns:p="http://schemas.openxmlformats.org/presentationml/2006/main">
+  <p:cSld>
+    <p:spTree>
+      <p:nvGrpSpPr>
+        <p:cNvPr id="1" name=""/>
+        <p:cNvGrpSpPr/>
+        <p:nvPr/>
+      </p:nvGrpSpPr>
+      <p:grpSpPr>
+        <a:xfrm>
+          <a:off x="0" y="0"/>
+          <a:ext cx="0" cy="0"/>
+          <a:chOff x="0" y="0"/>
+          <a:chExt cx="0" cy="0"/>
+        </a:xfrm>
+      </p:grpSpPr>
+      <p:sp>
+        <p:nvSpPr>
+          <p:cNvPr id="2" name="Slide Image Placeholder 1"/>
+          <p:cNvSpPr>
+            <a:spLocks noGrp="1" noRot="1" noChangeAspect="1"/>
+          </p:cNvSpPr>
+          <p:nvPr>
+            <p:ph type="sldImg"/>
+          </p:nvPr>
+        </p:nvSpPr>
+        <p:spPr/>
+      </p:sp>
+      <p:sp>
+        <p:nvSpPr>
+          <p:cNvPr id="3" name="Notes Placeholder 2"/>
+          <p:cNvSpPr>
+            <a:spLocks noGrp="1"/>
+          </p:cNvSpPr>
+          <p:nvPr>
+            <p:ph type="body" idx="1"/>
+          </p:nvPr>
+        </p:nvSpPr>
+        <p:spPr/>
+        <p:txBody>
+          <a:bodyPr/>
+          <a:lstStyle/>
+          <a:p>
+            <a:r>
+              <a:rPr lang="en-US" dirty="0" smtClean="0"/>
+              <a:t>null</a:t>
+            </a:r>
+            <a:endParaRPr lang="en-US" dirty="0"/>
+          </a:p>
+        </p:txBody>
+      </p:sp>
+      <p:sp>
+        <p:nvSpPr>
+          <p:cNvPr id="4" name="Slide Number Placeholder 3"/>
+          <p:cNvSpPr>
+            <a:spLocks noGrp="1"/>
+          </p:cNvSpPr>
+          <p:nvPr>
+            <p:ph type="sldNum" sz="quarter" idx="10"/>
+          </p:nvPr>
+        </p:nvSpPr>
+        <p:spPr/>
+        <p:txBody>
+          <a:bodyPr/>
+          <a:lstStyle/>
+          <a:p>
+            <a:fld id="{F7021451-1387-4CA6-816F-3879F97B5CBC}" type="slidenum">
+              <a:rPr lang="en-US" smtClean="0"/>
+              <a:t>2</a:t>
+            </a:fld>
+            <a:endParaRPr lang="en-US"/>
+          </a:p>
+        </p:txBody>
+      </p:sp>
+    </p:spTree>
+    <p:extLst>
+      <p:ext uri="{BB962C8B-B14F-4D97-AF65-F5344CB8AC3E}">
+        <p14:creationId xmlns:p14="http://schemas.microsoft.com/office/powerpoint/2010/main" val="1024086991"/>
+      </p:ext>
+    </p:extLst>
+  </p:cSld>
+  <p:clrMapOvr>
+    <a:masterClrMapping/>
+  </p:clrMapOvr>
+</p:notes>
+</file>
+
+<file path=ppt/notesSlides/notesSlide20.xml><?xml version="1.0" encoding="utf-8"?>
+<p:notes xmlns:a="http://schemas.openxmlformats.org/drawingml/2006/main" xmlns:r="http://schemas.openxmlformats.org/officeDocument/2006/relationships" xmlns:p="http://schemas.openxmlformats.org/presentationml/2006/main">
+  <p:cSld>
+    <p:spTree>
+      <p:nvGrpSpPr>
+        <p:cNvPr id="1" name=""/>
+        <p:cNvGrpSpPr/>
+        <p:nvPr/>
+      </p:nvGrpSpPr>
+      <p:grpSpPr>
+        <a:xfrm>
+          <a:off x="0" y="0"/>
+          <a:ext cx="0" cy="0"/>
+          <a:chOff x="0" y="0"/>
+          <a:chExt cx="0" cy="0"/>
+        </a:xfrm>
+      </p:grpSpPr>
+      <p:sp>
+        <p:nvSpPr>
+          <p:cNvPr id="2" name="Slide Image Placeholder 1"/>
+          <p:cNvSpPr>
+            <a:spLocks noGrp="1" noRot="1" noChangeAspect="1"/>
+          </p:cNvSpPr>
+          <p:nvPr>
+            <p:ph type="sldImg"/>
+          </p:nvPr>
+        </p:nvSpPr>
+        <p:spPr/>
+      </p:sp>
+      <p:sp>
+        <p:nvSpPr>
+          <p:cNvPr id="3" name="Notes Placeholder 2"/>
+          <p:cNvSpPr>
+            <a:spLocks noGrp="1"/>
+          </p:cNvSpPr>
+          <p:nvPr>
+            <p:ph type="body" idx="1"/>
+          </p:nvPr>
+        </p:nvSpPr>
+        <p:spPr/>
+        <p:txBody>
+          <a:bodyPr/>
+          <a:lstStyle/>
+          <a:p>
+            <a:r>
+              <a:rPr lang="en-US" dirty="0" smtClean="0"/>
+              <a:t>null</a:t>
+            </a:r>
+            <a:endParaRPr lang="en-US" dirty="0"/>
+          </a:p>
+        </p:txBody>
+      </p:sp>
+      <p:sp>
+        <p:nvSpPr>
+          <p:cNvPr id="4" name="Slide Number Placeholder 3"/>
+          <p:cNvSpPr>
+            <a:spLocks noGrp="1"/>
+          </p:cNvSpPr>
+          <p:nvPr>
+            <p:ph type="sldNum" sz="quarter" idx="10"/>
+          </p:nvPr>
+        </p:nvSpPr>
+        <p:spPr/>
+        <p:txBody>
+          <a:bodyPr/>
+          <a:lstStyle/>
+          <a:p>
+            <a:fld id="{F7021451-1387-4CA6-816F-3879F97B5CBC}" type="slidenum">
+              <a:rPr lang="en-US" smtClean="0"/>
+              <a:t>20</a:t>
+            </a:fld>
+            <a:endParaRPr lang="en-US"/>
+          </a:p>
+        </p:txBody>
+      </p:sp>
+    </p:spTree>
+    <p:extLst>
+      <p:ext uri="{BB962C8B-B14F-4D97-AF65-F5344CB8AC3E}">
+        <p14:creationId xmlns:p14="http://schemas.microsoft.com/office/powerpoint/2010/main" val="1024086991"/>
+      </p:ext>
+    </p:extLst>
+  </p:cSld>
+  <p:clrMapOvr>
+    <a:masterClrMapping/>
+  </p:clrMapOvr>
+</p:notes>
+</file>
+
+<file path=ppt/notesSlides/notesSlide21.xml><?xml version="1.0" encoding="utf-8"?>
+<p:notes xmlns:a="http://schemas.openxmlformats.org/drawingml/2006/main" xmlns:r="http://schemas.openxmlformats.org/officeDocument/2006/relationships" xmlns:p="http://schemas.openxmlformats.org/presentationml/2006/main">
+  <p:cSld>
+    <p:spTree>
+      <p:nvGrpSpPr>
+        <p:cNvPr id="1" name=""/>
+        <p:cNvGrpSpPr/>
+        <p:nvPr/>
+      </p:nvGrpSpPr>
+      <p:grpSpPr>
+        <a:xfrm>
+          <a:off x="0" y="0"/>
+          <a:ext cx="0" cy="0"/>
+          <a:chOff x="0" y="0"/>
+          <a:chExt cx="0" cy="0"/>
+        </a:xfrm>
+      </p:grpSpPr>
+      <p:sp>
+        <p:nvSpPr>
+          <p:cNvPr id="2" name="Slide Image Placeholder 1"/>
+          <p:cNvSpPr>
+            <a:spLocks noGrp="1" noRot="1" noChangeAspect="1"/>
+          </p:cNvSpPr>
+          <p:nvPr>
+            <p:ph type="sldImg"/>
+          </p:nvPr>
+        </p:nvSpPr>
+        <p:spPr/>
+      </p:sp>
+      <p:sp>
+        <p:nvSpPr>
+          <p:cNvPr id="3" name="Notes Placeholder 2"/>
+          <p:cNvSpPr>
+            <a:spLocks noGrp="1"/>
+          </p:cNvSpPr>
+          <p:nvPr>
+            <p:ph type="body" idx="1"/>
+          </p:nvPr>
+        </p:nvSpPr>
+        <p:spPr/>
+        <p:txBody>
+          <a:bodyPr/>
+          <a:lstStyle/>
+          <a:p>
+            <a:r>
+              <a:rPr lang="en-US" dirty="0" smtClean="0"/>
+              <a:t>null</a:t>
+            </a:r>
+            <a:endParaRPr lang="en-US" dirty="0"/>
+          </a:p>
+        </p:txBody>
+      </p:sp>
+      <p:sp>
+        <p:nvSpPr>
+          <p:cNvPr id="4" name="Slide Number Placeholder 3"/>
+          <p:cNvSpPr>
+            <a:spLocks noGrp="1"/>
+          </p:cNvSpPr>
+          <p:nvPr>
+            <p:ph type="sldNum" sz="quarter" idx="10"/>
+          </p:nvPr>
+        </p:nvSpPr>
+        <p:spPr/>
+        <p:txBody>
+          <a:bodyPr/>
+          <a:lstStyle/>
+          <a:p>
+            <a:fld id="{F7021451-1387-4CA6-816F-3879F97B5CBC}" type="slidenum">
+              <a:rPr lang="en-US" smtClean="0"/>
+              <a:t>21</a:t>
+            </a:fld>
+            <a:endParaRPr lang="en-US"/>
+          </a:p>
+        </p:txBody>
+      </p:sp>
+    </p:spTree>
+    <p:extLst>
+      <p:ext uri="{BB962C8B-B14F-4D97-AF65-F5344CB8AC3E}">
+        <p14:creationId xmlns:p14="http://schemas.microsoft.com/office/powerpoint/2010/main" val="1024086991"/>
+      </p:ext>
+    </p:extLst>
+  </p:cSld>
+  <p:clrMapOvr>
+    <a:masterClrMapping/>
+  </p:clrMapOvr>
+</p:notes>
+</file>
+
+<file path=ppt/notesSlides/notesSlide22.xml><?xml version="1.0" encoding="utf-8"?>
+<p:notes xmlns:a="http://schemas.openxmlformats.org/drawingml/2006/main" xmlns:r="http://schemas.openxmlformats.org/officeDocument/2006/relationships" xmlns:p="http://schemas.openxmlformats.org/presentationml/2006/main">
+  <p:cSld>
+    <p:spTree>
+      <p:nvGrpSpPr>
+        <p:cNvPr id="1" name=""/>
+        <p:cNvGrpSpPr/>
+        <p:nvPr/>
+      </p:nvGrpSpPr>
+      <p:grpSpPr>
+        <a:xfrm>
+          <a:off x="0" y="0"/>
+          <a:ext cx="0" cy="0"/>
+          <a:chOff x="0" y="0"/>
+          <a:chExt cx="0" cy="0"/>
+        </a:xfrm>
+      </p:grpSpPr>
+      <p:sp>
+        <p:nvSpPr>
+          <p:cNvPr id="2" name="Slide Image Placeholder 1"/>
+          <p:cNvSpPr>
+            <a:spLocks noGrp="1" noRot="1" noChangeAspect="1"/>
+          </p:cNvSpPr>
+          <p:nvPr>
+            <p:ph type="sldImg"/>
+          </p:nvPr>
+        </p:nvSpPr>
+        <p:spPr/>
+      </p:sp>
+      <p:sp>
+        <p:nvSpPr>
+          <p:cNvPr id="3" name="Notes Placeholder 2"/>
+          <p:cNvSpPr>
+            <a:spLocks noGrp="1"/>
+          </p:cNvSpPr>
+          <p:nvPr>
+            <p:ph type="body" idx="1"/>
+          </p:nvPr>
+        </p:nvSpPr>
+        <p:spPr/>
+        <p:txBody>
+          <a:bodyPr/>
+          <a:lstStyle/>
+          <a:p>
+            <a:r>
+              <a:rPr lang="en-US" dirty="0" smtClean="0"/>
+              <a:t>null</a:t>
+            </a:r>
+            <a:endParaRPr lang="en-US" dirty="0"/>
+          </a:p>
+        </p:txBody>
+      </p:sp>
+      <p:sp>
+        <p:nvSpPr>
+          <p:cNvPr id="4" name="Slide Number Placeholder 3"/>
+          <p:cNvSpPr>
+            <a:spLocks noGrp="1"/>
+          </p:cNvSpPr>
+          <p:nvPr>
+            <p:ph type="sldNum" sz="quarter" idx="10"/>
+          </p:nvPr>
+        </p:nvSpPr>
+        <p:spPr/>
+        <p:txBody>
+          <a:bodyPr/>
+          <a:lstStyle/>
+          <a:p>
+            <a:fld id="{F7021451-1387-4CA6-816F-3879F97B5CBC}" type="slidenum">
+              <a:rPr lang="en-US" smtClean="0"/>
+              <a:t>22</a:t>
+            </a:fld>
+            <a:endParaRPr lang="en-US"/>
+          </a:p>
+        </p:txBody>
+      </p:sp>
+    </p:spTree>
+    <p:extLst>
+      <p:ext uri="{BB962C8B-B14F-4D97-AF65-F5344CB8AC3E}">
+        <p14:creationId xmlns:p14="http://schemas.microsoft.com/office/powerpoint/2010/main" val="1024086991"/>
+      </p:ext>
+    </p:extLst>
+  </p:cSld>
+  <p:clrMapOvr>
+    <a:masterClrMapping/>
+  </p:clrMapOvr>
+</p:notes>
+</file>
+
+<file path=ppt/notesSlides/notesSlide23.xml><?xml version="1.0" encoding="utf-8"?>
+<p:notes xmlns:a="http://schemas.openxmlformats.org/drawingml/2006/main" xmlns:r="http://schemas.openxmlformats.org/officeDocument/2006/relationships" xmlns:p="http://schemas.openxmlformats.org/presentationml/2006/main">
+  <p:cSld>
+    <p:spTree>
+      <p:nvGrpSpPr>
+        <p:cNvPr id="1" name=""/>
+        <p:cNvGrpSpPr/>
+        <p:nvPr/>
+      </p:nvGrpSpPr>
+      <p:grpSpPr>
+        <a:xfrm>
+          <a:off x="0" y="0"/>
+          <a:ext cx="0" cy="0"/>
+          <a:chOff x="0" y="0"/>
+          <a:chExt cx="0" cy="0"/>
+        </a:xfrm>
+      </p:grpSpPr>
+      <p:sp>
+        <p:nvSpPr>
+          <p:cNvPr id="2" name="Slide Image Placeholder 1"/>
+          <p:cNvSpPr>
+            <a:spLocks noGrp="1" noRot="1" noChangeAspect="1"/>
+          </p:cNvSpPr>
+          <p:nvPr>
+            <p:ph type="sldImg"/>
+          </p:nvPr>
+        </p:nvSpPr>
+        <p:spPr/>
+      </p:sp>
+      <p:sp>
+        <p:nvSpPr>
+          <p:cNvPr id="3" name="Notes Placeholder 2"/>
+          <p:cNvSpPr>
+            <a:spLocks noGrp="1"/>
+          </p:cNvSpPr>
+          <p:nvPr>
+            <p:ph type="body" idx="1"/>
+          </p:nvPr>
+        </p:nvSpPr>
+        <p:spPr/>
+        <p:txBody>
+          <a:bodyPr/>
+          <a:lstStyle/>
+          <a:p>
+            <a:r>
+              <a:rPr lang="en-US" dirty="0" smtClean="0"/>
+              <a:t>null</a:t>
+            </a:r>
+            <a:endParaRPr lang="en-US" dirty="0"/>
+          </a:p>
+        </p:txBody>
+      </p:sp>
+      <p:sp>
+        <p:nvSpPr>
+          <p:cNvPr id="4" name="Slide Number Placeholder 3"/>
+          <p:cNvSpPr>
+            <a:spLocks noGrp="1"/>
+          </p:cNvSpPr>
+          <p:nvPr>
+            <p:ph type="sldNum" sz="quarter" idx="10"/>
+          </p:nvPr>
+        </p:nvSpPr>
+        <p:spPr/>
+        <p:txBody>
+          <a:bodyPr/>
+          <a:lstStyle/>
+          <a:p>
+            <a:fld id="{F7021451-1387-4CA6-816F-3879F97B5CBC}" type="slidenum">
+              <a:rPr lang="en-US" smtClean="0"/>
+              <a:t>23</a:t>
+            </a:fld>
+            <a:endParaRPr lang="en-US"/>
+          </a:p>
+        </p:txBody>
+      </p:sp>
+    </p:spTree>
+    <p:extLst>
+      <p:ext uri="{BB962C8B-B14F-4D97-AF65-F5344CB8AC3E}">
+        <p14:creationId xmlns:p14="http://schemas.microsoft.com/office/powerpoint/2010/main" val="1024086991"/>
+      </p:ext>
+    </p:extLst>
+  </p:cSld>
+  <p:clrMapOvr>
+    <a:masterClrMapping/>
+  </p:clrMapOvr>
+</p:notes>
+</file>
+
+<file path=ppt/notesSlides/notesSlide24.xml><?xml version="1.0" encoding="utf-8"?>
+<p:notes xmlns:a="http://schemas.openxmlformats.org/drawingml/2006/main" xmlns:r="http://schemas.openxmlformats.org/officeDocument/2006/relationships" xmlns:p="http://schemas.openxmlformats.org/presentationml/2006/main">
+  <p:cSld>
+    <p:spTree>
+      <p:nvGrpSpPr>
+        <p:cNvPr id="1" name=""/>
+        <p:cNvGrpSpPr/>
+        <p:nvPr/>
+      </p:nvGrpSpPr>
+      <p:grpSpPr>
+        <a:xfrm>
+          <a:off x="0" y="0"/>
+          <a:ext cx="0" cy="0"/>
+          <a:chOff x="0" y="0"/>
+          <a:chExt cx="0" cy="0"/>
+        </a:xfrm>
+      </p:grpSpPr>
+      <p:sp>
+        <p:nvSpPr>
+          <p:cNvPr id="2" name="Slide Image Placeholder 1"/>
+          <p:cNvSpPr>
+            <a:spLocks noGrp="1" noRot="1" noChangeAspect="1"/>
+          </p:cNvSpPr>
+          <p:nvPr>
+            <p:ph type="sldImg"/>
+          </p:nvPr>
+        </p:nvSpPr>
+        <p:spPr/>
+      </p:sp>
+      <p:sp>
+        <p:nvSpPr>
+          <p:cNvPr id="3" name="Notes Placeholder 2"/>
+          <p:cNvSpPr>
+            <a:spLocks noGrp="1"/>
+          </p:cNvSpPr>
+          <p:nvPr>
+            <p:ph type="body" idx="1"/>
+          </p:nvPr>
+        </p:nvSpPr>
+        <p:spPr/>
+        <p:txBody>
+          <a:bodyPr/>
+          <a:lstStyle/>
+          <a:p>
+            <a:r>
+              <a:rPr lang="en-US" dirty="0" smtClean="0"/>
+              <a:t>null</a:t>
+            </a:r>
+            <a:endParaRPr lang="en-US" dirty="0"/>
+          </a:p>
+        </p:txBody>
+      </p:sp>
+      <p:sp>
+        <p:nvSpPr>
+          <p:cNvPr id="4" name="Slide Number Placeholder 3"/>
+          <p:cNvSpPr>
+            <a:spLocks noGrp="1"/>
+          </p:cNvSpPr>
+          <p:nvPr>
+            <p:ph type="sldNum" sz="quarter" idx="10"/>
+          </p:nvPr>
+        </p:nvSpPr>
+        <p:spPr/>
+        <p:txBody>
+          <a:bodyPr/>
+          <a:lstStyle/>
+          <a:p>
+            <a:fld id="{F7021451-1387-4CA6-816F-3879F97B5CBC}" type="slidenum">
+              <a:rPr lang="en-US" smtClean="0"/>
+              <a:t>24</a:t>
+            </a:fld>
+            <a:endParaRPr lang="en-US"/>
+          </a:p>
+        </p:txBody>
+      </p:sp>
+    </p:spTree>
+    <p:extLst>
+      <p:ext uri="{BB962C8B-B14F-4D97-AF65-F5344CB8AC3E}">
+        <p14:creationId xmlns:p14="http://schemas.microsoft.com/office/powerpoint/2010/main" val="1024086991"/>
+      </p:ext>
+    </p:extLst>
+  </p:cSld>
+  <p:clrMapOvr>
+    <a:masterClrMapping/>
+  </p:clrMapOvr>
+</p:notes>
+</file>
+
+<file path=ppt/notesSlides/notesSlide3.xml><?xml version="1.0" encoding="utf-8"?>
+<p:notes xmlns:a="http://schemas.openxmlformats.org/drawingml/2006/main" xmlns:r="http://schemas.openxmlformats.org/officeDocument/2006/relationships" xmlns:p="http://schemas.openxmlformats.org/presentationml/2006/main">
+  <p:cSld>
+    <p:spTree>
+      <p:nvGrpSpPr>
+        <p:cNvPr id="1" name=""/>
+        <p:cNvGrpSpPr/>
+        <p:nvPr/>
+      </p:nvGrpSpPr>
+      <p:grpSpPr>
+        <a:xfrm>
+          <a:off x="0" y="0"/>
+          <a:ext cx="0" cy="0"/>
+          <a:chOff x="0" y="0"/>
+          <a:chExt cx="0" cy="0"/>
+        </a:xfrm>
+      </p:grpSpPr>
+      <p:sp>
+        <p:nvSpPr>
+          <p:cNvPr id="2" name="Slide Image Placeholder 1"/>
+          <p:cNvSpPr>
+            <a:spLocks noGrp="1" noRot="1" noChangeAspect="1"/>
+          </p:cNvSpPr>
+          <p:nvPr>
+            <p:ph type="sldImg"/>
+          </p:nvPr>
+        </p:nvSpPr>
+        <p:spPr/>
+      </p:sp>
+      <p:sp>
+        <p:nvSpPr>
+          <p:cNvPr id="3" name="Notes Placeholder 2"/>
+          <p:cNvSpPr>
+            <a:spLocks noGrp="1"/>
+          </p:cNvSpPr>
+          <p:nvPr>
+            <p:ph type="body" idx="1"/>
+          </p:nvPr>
+        </p:nvSpPr>
+        <p:spPr/>
+        <p:txBody>
+          <a:bodyPr/>
+          <a:lstStyle/>
+          <a:p>
+            <a:r>
+              <a:rPr lang="en-US" dirty="0" smtClean="0"/>
+              <a:t>null</a:t>
+            </a:r>
+            <a:endParaRPr lang="en-US" dirty="0"/>
+          </a:p>
+        </p:txBody>
+      </p:sp>
+      <p:sp>
+        <p:nvSpPr>
+          <p:cNvPr id="4" name="Slide Number Placeholder 3"/>
+          <p:cNvSpPr>
+            <a:spLocks noGrp="1"/>
+          </p:cNvSpPr>
+          <p:nvPr>
+            <p:ph type="sldNum" sz="quarter" idx="10"/>
+          </p:nvPr>
+        </p:nvSpPr>
+        <p:spPr/>
+        <p:txBody>
+          <a:bodyPr/>
+          <a:lstStyle/>
+          <a:p>
+            <a:fld id="{F7021451-1387-4CA6-816F-3879F97B5CBC}" type="slidenum">
+              <a:rPr lang="en-US" smtClean="0"/>
+              <a:t>3</a:t>
+            </a:fld>
+            <a:endParaRPr lang="en-US"/>
+          </a:p>
+        </p:txBody>
+      </p:sp>
+    </p:spTree>
+    <p:extLst>
+      <p:ext uri="{BB962C8B-B14F-4D97-AF65-F5344CB8AC3E}">
+        <p14:creationId xmlns:p14="http://schemas.microsoft.com/office/powerpoint/2010/main" val="1024086991"/>
+      </p:ext>
+    </p:extLst>
+  </p:cSld>
+  <p:clrMapOvr>
+    <a:masterClrMapping/>
+  </p:clrMapOvr>
+</p:notes>
+</file>
+
+<file path=ppt/notesSlides/notesSlide4.xml><?xml version="1.0" encoding="utf-8"?>
+<p:notes xmlns:a="http://schemas.openxmlformats.org/drawingml/2006/main" xmlns:r="http://schemas.openxmlformats.org/officeDocument/2006/relationships" xmlns:p="http://schemas.openxmlformats.org/presentationml/2006/main">
+  <p:cSld>
+    <p:spTree>
+      <p:nvGrpSpPr>
+        <p:cNvPr id="1" name=""/>
+        <p:cNvGrpSpPr/>
+        <p:nvPr/>
+      </p:nvGrpSpPr>
+      <p:grpSpPr>
+        <a:xfrm>
+          <a:off x="0" y="0"/>
+          <a:ext cx="0" cy="0"/>
+          <a:chOff x="0" y="0"/>
+          <a:chExt cx="0" cy="0"/>
+        </a:xfrm>
+      </p:grpSpPr>
+      <p:sp>
+        <p:nvSpPr>
+          <p:cNvPr id="2" name="Slide Image Placeholder 1"/>
+          <p:cNvSpPr>
+            <a:spLocks noGrp="1" noRot="1" noChangeAspect="1"/>
+          </p:cNvSpPr>
+          <p:nvPr>
+            <p:ph type="sldImg"/>
+          </p:nvPr>
+        </p:nvSpPr>
+        <p:spPr/>
+      </p:sp>
+      <p:sp>
+        <p:nvSpPr>
+          <p:cNvPr id="3" name="Notes Placeholder 2"/>
+          <p:cNvSpPr>
+            <a:spLocks noGrp="1"/>
+          </p:cNvSpPr>
+          <p:nvPr>
+            <p:ph type="body" idx="1"/>
+          </p:nvPr>
+        </p:nvSpPr>
+        <p:spPr/>
+        <p:txBody>
+          <a:bodyPr/>
+          <a:lstStyle/>
+          <a:p>
+            <a:r>
+              <a:rPr lang="en-US" dirty="0" smtClean="0"/>
+              <a:t>null</a:t>
+            </a:r>
+            <a:endParaRPr lang="en-US" dirty="0"/>
+          </a:p>
+        </p:txBody>
+      </p:sp>
+      <p:sp>
+        <p:nvSpPr>
+          <p:cNvPr id="4" name="Slide Number Placeholder 3"/>
+          <p:cNvSpPr>
+            <a:spLocks noGrp="1"/>
+          </p:cNvSpPr>
+          <p:nvPr>
+            <p:ph type="sldNum" sz="quarter" idx="10"/>
+          </p:nvPr>
+        </p:nvSpPr>
+        <p:spPr/>
+        <p:txBody>
+          <a:bodyPr/>
+          <a:lstStyle/>
+          <a:p>
+            <a:fld id="{F7021451-1387-4CA6-816F-3879F97B5CBC}" type="slidenum">
+              <a:rPr lang="en-US" smtClean="0"/>
+              <a:t>4</a:t>
+            </a:fld>
+            <a:endParaRPr lang="en-US"/>
+          </a:p>
+        </p:txBody>
+      </p:sp>
+    </p:spTree>
+    <p:extLst>
+      <p:ext uri="{BB962C8B-B14F-4D97-AF65-F5344CB8AC3E}">
+        <p14:creationId xmlns:p14="http://schemas.microsoft.com/office/powerpoint/2010/main" val="1024086991"/>
+      </p:ext>
+    </p:extLst>
+  </p:cSld>
+  <p:clrMapOvr>
+    <a:masterClrMapping/>
+  </p:clrMapOvr>
+</p:notes>
+</file>
+
+<file path=ppt/notesSlides/notesSlide5.xml><?xml version="1.0" encoding="utf-8"?>
+<p:notes xmlns:a="http://schemas.openxmlformats.org/drawingml/2006/main" xmlns:r="http://schemas.openxmlformats.org/officeDocument/2006/relationships" xmlns:p="http://schemas.openxmlformats.org/presentationml/2006/main">
+  <p:cSld>
+    <p:spTree>
+      <p:nvGrpSpPr>
+        <p:cNvPr id="1" name=""/>
+        <p:cNvGrpSpPr/>
+        <p:nvPr/>
+      </p:nvGrpSpPr>
+      <p:grpSpPr>
+        <a:xfrm>
+          <a:off x="0" y="0"/>
+          <a:ext cx="0" cy="0"/>
+          <a:chOff x="0" y="0"/>
+          <a:chExt cx="0" cy="0"/>
+        </a:xfrm>
+      </p:grpSpPr>
+      <p:sp>
+        <p:nvSpPr>
+          <p:cNvPr id="2" name="Slide Image Placeholder 1"/>
+          <p:cNvSpPr>
+            <a:spLocks noGrp="1" noRot="1" noChangeAspect="1"/>
+          </p:cNvSpPr>
+          <p:nvPr>
+            <p:ph type="sldImg"/>
+          </p:nvPr>
+        </p:nvSpPr>
+        <p:spPr/>
+      </p:sp>
+      <p:sp>
+        <p:nvSpPr>
+          <p:cNvPr id="3" name="Notes Placeholder 2"/>
+          <p:cNvSpPr>
+            <a:spLocks noGrp="1"/>
+          </p:cNvSpPr>
+          <p:nvPr>
+            <p:ph type="body" idx="1"/>
+          </p:nvPr>
+        </p:nvSpPr>
+        <p:spPr/>
+        <p:txBody>
+          <a:bodyPr/>
+          <a:lstStyle/>
+          <a:p>
+            <a:r>
+              <a:rPr lang="en-US" dirty="0" smtClean="0"/>
+              <a:t>null</a:t>
+            </a:r>
+            <a:endParaRPr lang="en-US" dirty="0"/>
+          </a:p>
+        </p:txBody>
+      </p:sp>
+      <p:sp>
+        <p:nvSpPr>
+          <p:cNvPr id="4" name="Slide Number Placeholder 3"/>
+          <p:cNvSpPr>
+            <a:spLocks noGrp="1"/>
+          </p:cNvSpPr>
+          <p:nvPr>
+            <p:ph type="sldNum" sz="quarter" idx="10"/>
+          </p:nvPr>
+        </p:nvSpPr>
+        <p:spPr/>
+        <p:txBody>
+          <a:bodyPr/>
+          <a:lstStyle/>
+          <a:p>
+            <a:fld id="{F7021451-1387-4CA6-816F-3879F97B5CBC}" type="slidenum">
+              <a:rPr lang="en-US" smtClean="0"/>
+              <a:t>5</a:t>
+            </a:fld>
+            <a:endParaRPr lang="en-US"/>
+          </a:p>
+        </p:txBody>
+      </p:sp>
+    </p:spTree>
+    <p:extLst>
+      <p:ext uri="{BB962C8B-B14F-4D97-AF65-F5344CB8AC3E}">
+        <p14:creationId xmlns:p14="http://schemas.microsoft.com/office/powerpoint/2010/main" val="1024086991"/>
+      </p:ext>
+    </p:extLst>
+  </p:cSld>
+  <p:clrMapOvr>
+    <a:masterClrMapping/>
+  </p:clrMapOvr>
+</p:notes>
+</file>
+
+<file path=ppt/notesSlides/notesSlide6.xml><?xml version="1.0" encoding="utf-8"?>
+<p:notes xmlns:a="http://schemas.openxmlformats.org/drawingml/2006/main" xmlns:r="http://schemas.openxmlformats.org/officeDocument/2006/relationships" xmlns:p="http://schemas.openxmlformats.org/presentationml/2006/main">
+  <p:cSld>
+    <p:spTree>
+      <p:nvGrpSpPr>
+        <p:cNvPr id="1" name=""/>
+        <p:cNvGrpSpPr/>
+        <p:nvPr/>
+      </p:nvGrpSpPr>
+      <p:grpSpPr>
+        <a:xfrm>
+          <a:off x="0" y="0"/>
+          <a:ext cx="0" cy="0"/>
+          <a:chOff x="0" y="0"/>
+          <a:chExt cx="0" cy="0"/>
+        </a:xfrm>
+      </p:grpSpPr>
+      <p:sp>
+        <p:nvSpPr>
+          <p:cNvPr id="2" name="Slide Image Placeholder 1"/>
+          <p:cNvSpPr>
+            <a:spLocks noGrp="1" noRot="1" noChangeAspect="1"/>
+          </p:cNvSpPr>
+          <p:nvPr>
+            <p:ph type="sldImg"/>
+          </p:nvPr>
+        </p:nvSpPr>
+        <p:spPr/>
+      </p:sp>
+      <p:sp>
+        <p:nvSpPr>
+          <p:cNvPr id="3" name="Notes Placeholder 2"/>
+          <p:cNvSpPr>
+            <a:spLocks noGrp="1"/>
+          </p:cNvSpPr>
+          <p:nvPr>
+            <p:ph type="body" idx="1"/>
+          </p:nvPr>
+        </p:nvSpPr>
+        <p:spPr/>
+        <p:txBody>
+          <a:bodyPr/>
+          <a:lstStyle/>
+          <a:p>
+            <a:r>
+              <a:rPr lang="en-US" dirty="0" smtClean="0"/>
+              <a:t>null</a:t>
+            </a:r>
+            <a:endParaRPr lang="en-US" dirty="0"/>
+          </a:p>
+        </p:txBody>
+      </p:sp>
+      <p:sp>
+        <p:nvSpPr>
+          <p:cNvPr id="4" name="Slide Number Placeholder 3"/>
+          <p:cNvSpPr>
+            <a:spLocks noGrp="1"/>
+          </p:cNvSpPr>
+          <p:nvPr>
+            <p:ph type="sldNum" sz="quarter" idx="10"/>
+          </p:nvPr>
+        </p:nvSpPr>
+        <p:spPr/>
+        <p:txBody>
+          <a:bodyPr/>
+          <a:lstStyle/>
+          <a:p>
+            <a:fld id="{F7021451-1387-4CA6-816F-3879F97B5CBC}" type="slidenum">
+              <a:rPr lang="en-US" smtClean="0"/>
+              <a:t>6</a:t>
+            </a:fld>
+            <a:endParaRPr lang="en-US"/>
+          </a:p>
+        </p:txBody>
+      </p:sp>
+    </p:spTree>
+    <p:extLst>
+      <p:ext uri="{BB962C8B-B14F-4D97-AF65-F5344CB8AC3E}">
+        <p14:creationId xmlns:p14="http://schemas.microsoft.com/office/powerpoint/2010/main" val="1024086991"/>
+      </p:ext>
+    </p:extLst>
+  </p:cSld>
+  <p:clrMapOvr>
+    <a:masterClrMapping/>
+  </p:clrMapOvr>
+</p:notes>
+</file>
+
+<file path=ppt/notesSlides/notesSlide7.xml><?xml version="1.0" encoding="utf-8"?>
+<p:notes xmlns:a="http://schemas.openxmlformats.org/drawingml/2006/main" xmlns:r="http://schemas.openxmlformats.org/officeDocument/2006/relationships" xmlns:p="http://schemas.openxmlformats.org/presentationml/2006/main">
+  <p:cSld>
+    <p:spTree>
+      <p:nvGrpSpPr>
+        <p:cNvPr id="1" name=""/>
+        <p:cNvGrpSpPr/>
+        <p:nvPr/>
+      </p:nvGrpSpPr>
+      <p:grpSpPr>
+        <a:xfrm>
+          <a:off x="0" y="0"/>
+          <a:ext cx="0" cy="0"/>
+          <a:chOff x="0" y="0"/>
+          <a:chExt cx="0" cy="0"/>
+        </a:xfrm>
+      </p:grpSpPr>
+      <p:sp>
+        <p:nvSpPr>
+          <p:cNvPr id="2" name="Slide Image Placeholder 1"/>
+          <p:cNvSpPr>
+            <a:spLocks noGrp="1" noRot="1" noChangeAspect="1"/>
+          </p:cNvSpPr>
+          <p:nvPr>
+            <p:ph type="sldImg"/>
+          </p:nvPr>
+        </p:nvSpPr>
+        <p:spPr/>
+      </p:sp>
+      <p:sp>
+        <p:nvSpPr>
+          <p:cNvPr id="3" name="Notes Placeholder 2"/>
+          <p:cNvSpPr>
+            <a:spLocks noGrp="1"/>
+          </p:cNvSpPr>
+          <p:nvPr>
+            <p:ph type="body" idx="1"/>
+          </p:nvPr>
+        </p:nvSpPr>
+        <p:spPr/>
+        <p:txBody>
+          <a:bodyPr/>
+          <a:lstStyle/>
+          <a:p>
+            <a:r>
+              <a:rPr lang="en-US" dirty="0" smtClean="0"/>
+              <a:t>null</a:t>
+            </a:r>
+            <a:endParaRPr lang="en-US" dirty="0"/>
+          </a:p>
+        </p:txBody>
+      </p:sp>
+      <p:sp>
+        <p:nvSpPr>
+          <p:cNvPr id="4" name="Slide Number Placeholder 3"/>
+          <p:cNvSpPr>
+            <a:spLocks noGrp="1"/>
+          </p:cNvSpPr>
+          <p:nvPr>
+            <p:ph type="sldNum" sz="quarter" idx="10"/>
+          </p:nvPr>
+        </p:nvSpPr>
+        <p:spPr/>
+        <p:txBody>
+          <a:bodyPr/>
+          <a:lstStyle/>
+          <a:p>
+            <a:fld id="{F7021451-1387-4CA6-816F-3879F97B5CBC}" type="slidenum">
+              <a:rPr lang="en-US" smtClean="0"/>
+              <a:t>7</a:t>
+            </a:fld>
+            <a:endParaRPr lang="en-US"/>
+          </a:p>
+        </p:txBody>
+      </p:sp>
+    </p:spTree>
+    <p:extLst>
+      <p:ext uri="{BB962C8B-B14F-4D97-AF65-F5344CB8AC3E}">
+        <p14:creationId xmlns:p14="http://schemas.microsoft.com/office/powerpoint/2010/main" val="1024086991"/>
+      </p:ext>
+    </p:extLst>
+  </p:cSld>
+  <p:clrMapOvr>
+    <a:masterClrMapping/>
+  </p:clrMapOvr>
+</p:notes>
+</file>
+
+<file path=ppt/notesSlides/notesSlide8.xml><?xml version="1.0" encoding="utf-8"?>
+<p:notes xmlns:a="http://schemas.openxmlformats.org/drawingml/2006/main" xmlns:r="http://schemas.openxmlformats.org/officeDocument/2006/relationships" xmlns:p="http://schemas.openxmlformats.org/presentationml/2006/main">
+  <p:cSld>
+    <p:spTree>
+      <p:nvGrpSpPr>
+        <p:cNvPr id="1" name=""/>
+        <p:cNvGrpSpPr/>
+        <p:nvPr/>
+      </p:nvGrpSpPr>
+      <p:grpSpPr>
+        <a:xfrm>
+          <a:off x="0" y="0"/>
+          <a:ext cx="0" cy="0"/>
+          <a:chOff x="0" y="0"/>
+          <a:chExt cx="0" cy="0"/>
+        </a:xfrm>
+      </p:grpSpPr>
+      <p:sp>
+        <p:nvSpPr>
+          <p:cNvPr id="2" name="Slide Image Placeholder 1"/>
+          <p:cNvSpPr>
+            <a:spLocks noGrp="1" noRot="1" noChangeAspect="1"/>
+          </p:cNvSpPr>
+          <p:nvPr>
+            <p:ph type="sldImg"/>
+          </p:nvPr>
+        </p:nvSpPr>
+        <p:spPr/>
+      </p:sp>
+      <p:sp>
+        <p:nvSpPr>
+          <p:cNvPr id="3" name="Notes Placeholder 2"/>
+          <p:cNvSpPr>
+            <a:spLocks noGrp="1"/>
+          </p:cNvSpPr>
+          <p:nvPr>
+            <p:ph type="body" idx="1"/>
+          </p:nvPr>
+        </p:nvSpPr>
+        <p:spPr/>
+        <p:txBody>
+          <a:bodyPr/>
+          <a:lstStyle/>
+          <a:p>
+            <a:r>
+              <a:rPr lang="en-US" dirty="0" smtClean="0"/>
+              <a:t>null</a:t>
+            </a:r>
+            <a:endParaRPr lang="en-US" dirty="0"/>
+          </a:p>
+        </p:txBody>
+      </p:sp>
+      <p:sp>
+        <p:nvSpPr>
+          <p:cNvPr id="4" name="Slide Number Placeholder 3"/>
+          <p:cNvSpPr>
+            <a:spLocks noGrp="1"/>
+          </p:cNvSpPr>
+          <p:nvPr>
+            <p:ph type="sldNum" sz="quarter" idx="10"/>
+          </p:nvPr>
+        </p:nvSpPr>
+        <p:spPr/>
+        <p:txBody>
+          <a:bodyPr/>
+          <a:lstStyle/>
+          <a:p>
+            <a:fld id="{F7021451-1387-4CA6-816F-3879F97B5CBC}" type="slidenum">
+              <a:rPr lang="en-US" smtClean="0"/>
+              <a:t>8</a:t>
+            </a:fld>
+            <a:endParaRPr lang="en-US"/>
+          </a:p>
+        </p:txBody>
+      </p:sp>
+    </p:spTree>
+    <p:extLst>
+      <p:ext uri="{BB962C8B-B14F-4D97-AF65-F5344CB8AC3E}">
+        <p14:creationId xmlns:p14="http://schemas.microsoft.com/office/powerpoint/2010/main" val="1024086991"/>
+      </p:ext>
+    </p:extLst>
+  </p:cSld>
+  <p:clrMapOvr>
+    <a:masterClrMapping/>
+  </p:clrMapOvr>
+</p:notes>
+</file>
+
+<file path=ppt/notesSlides/notesSlide9.xml><?xml version="1.0" encoding="utf-8"?>
+<p:notes xmlns:a="http://schemas.openxmlformats.org/drawingml/2006/main" xmlns:r="http://schemas.openxmlformats.org/officeDocument/2006/relationships" xmlns:p="http://schemas.openxmlformats.org/presentationml/2006/main">
+  <p:cSld>
+    <p:spTree>
+      <p:nvGrpSpPr>
+        <p:cNvPr id="1" name=""/>
+        <p:cNvGrpSpPr/>
+        <p:nvPr/>
+      </p:nvGrpSpPr>
+      <p:grpSpPr>
+        <a:xfrm>
+          <a:off x="0" y="0"/>
+          <a:ext cx="0" cy="0"/>
+          <a:chOff x="0" y="0"/>
+          <a:chExt cx="0" cy="0"/>
+        </a:xfrm>
+      </p:grpSpPr>
+      <p:sp>
+        <p:nvSpPr>
+          <p:cNvPr id="2" name="Slide Image Placeholder 1"/>
+          <p:cNvSpPr>
+            <a:spLocks noGrp="1" noRot="1" noChangeAspect="1"/>
+          </p:cNvSpPr>
+          <p:nvPr>
+            <p:ph type="sldImg"/>
+          </p:nvPr>
+        </p:nvSpPr>
+        <p:spPr/>
+      </p:sp>
+      <p:sp>
+        <p:nvSpPr>
+          <p:cNvPr id="3" name="Notes Placeholder 2"/>
+          <p:cNvSpPr>
+            <a:spLocks noGrp="1"/>
+          </p:cNvSpPr>
+          <p:nvPr>
+            <p:ph type="body" idx="1"/>
+          </p:nvPr>
+        </p:nvSpPr>
+        <p:spPr/>
+        <p:txBody>
+          <a:bodyPr/>
+          <a:lstStyle/>
+          <a:p>
+            <a:r>
+              <a:rPr lang="en-US" dirty="0" smtClean="0"/>
+              <a:t>null</a:t>
+            </a:r>
+            <a:endParaRPr lang="en-US" dirty="0"/>
+          </a:p>
+        </p:txBody>
+      </p:sp>
+      <p:sp>
+        <p:nvSpPr>
+          <p:cNvPr id="4" name="Slide Number Placeholder 3"/>
+          <p:cNvSpPr>
+            <a:spLocks noGrp="1"/>
+          </p:cNvSpPr>
+          <p:nvPr>
+            <p:ph type="sldNum" sz="quarter" idx="10"/>
+          </p:nvPr>
+        </p:nvSpPr>
+        <p:spPr/>
+        <p:txBody>
+          <a:bodyPr/>
+          <a:lstStyle/>
+          <a:p>
+            <a:fld id="{F7021451-1387-4CA6-816F-3879F97B5CBC}" type="slidenum">
+              <a:rPr lang="en-US" smtClean="0"/>
+              <a:t>9</a:t>
+            </a:fld>
+            <a:endParaRPr lang="en-US"/>
+          </a:p>
+        </p:txBody>
+      </p:sp>
+    </p:spTree>
+    <p:extLst>
+      <p:ext uri="{BB962C8B-B14F-4D97-AF65-F5344CB8AC3E}">
+        <p14:creationId xmlns:p14="http://schemas.microsoft.com/office/powerpoint/2010/main" val="1024086991"/>
+      </p:ext>
+    </p:extLst>
+  </p:cSld>
+  <p:clrMapOvr>
+    <a:masterClrMapping/>
+  </p:clrMapOvr>
+</p:notes>
+</file>
+
 <file path=ppt/slideLayouts/slideLayout1.xml><?xml version="1.0" encoding="utf-8"?>
-<p:sldLayout xmlns:a="http://schemas.openxmlformats.org/drawingml/2006/main" xmlns:r="http://schemas.openxmlformats.org/officeDocument/2006/relationships" xmlns:p="http://schemas.openxmlformats.org/presentationml/2006/main" preserve="1" userDrawn="1">
+<p:sldLayout xmlns:a="http://schemas.openxmlformats.org/drawingml/2006/main" xmlns:r="http://schemas.openxmlformats.org/officeDocument/2006/relationships" xmlns:p="http://schemas.openxmlformats.org/presentationml/2006/main" preserve="1">
   <p:cSld name="BLANK">
     <p:spTree>
       <p:nvGrpSpPr>
@@ -203,7 +2664,7 @@
           <a:spcPct val="20000"/>
         </a:spcBef>
         <a:buFont typeface="Arial" pitchFamily="34" charset="0"/>
-        <a:buChar char="?"/>
+        <a:buChar char="•"/>
         <a:defRPr sz="3200" kern="1200">
           <a:solidFill>
             <a:schemeClr val="tx1"/>
@@ -218,7 +2679,7 @@
           <a:spcPct val="20000"/>
         </a:spcBef>
         <a:buFont typeface="Arial" pitchFamily="34" charset="0"/>
-        <a:buChar char="?"/>
+        <a:buChar char="–"/>
         <a:defRPr sz="2800" kern="1200">
           <a:solidFill>
             <a:schemeClr val="tx1"/>
@@ -233,7 +2694,7 @@
           <a:spcPct val="20000"/>
         </a:spcBef>
         <a:buFont typeface="Arial" pitchFamily="34" charset="0"/>
-        <a:buChar char="?"/>
+        <a:buChar char="•"/>
         <a:defRPr sz="2400" kern="1200">
           <a:solidFill>
             <a:schemeClr val="tx1"/>
@@ -248,7 +2709,7 @@
           <a:spcPct val="20000"/>
         </a:spcBef>
         <a:buFont typeface="Arial" pitchFamily="34" charset="0"/>
-        <a:buChar char="?"/>
+        <a:buChar char="–"/>
         <a:defRPr sz="2000" kern="1200">
           <a:solidFill>
             <a:schemeClr val="tx1"/>
@@ -263,7 +2724,7 @@
           <a:spcPct val="20000"/>
         </a:spcBef>
         <a:buFont typeface="Arial" pitchFamily="34" charset="0"/>
-        <a:buChar char="?"/>
+        <a:buChar char="»"/>
         <a:defRPr sz="2000" kern="1200">
           <a:solidFill>
             <a:schemeClr val="tx1"/>
@@ -278,7 +2739,7 @@
           <a:spcPct val="20000"/>
         </a:spcBef>
         <a:buFont typeface="Arial" pitchFamily="34" charset="0"/>
-        <a:buChar char="?"/>
+        <a:buChar char="•"/>
         <a:defRPr sz="2000" kern="1200">
           <a:solidFill>
             <a:schemeClr val="tx1"/>
@@ -293,7 +2754,7 @@
           <a:spcPct val="20000"/>
         </a:spcBef>
         <a:buFont typeface="Arial" pitchFamily="34" charset="0"/>
-        <a:buChar char="?"/>
+        <a:buChar char="•"/>
         <a:defRPr sz="2000" kern="1200">
           <a:solidFill>
             <a:schemeClr val="tx1"/>
@@ -308,7 +2769,7 @@
           <a:spcPct val="20000"/>
         </a:spcBef>
         <a:buFont typeface="Arial" pitchFamily="34" charset="0"/>
-        <a:buChar char="?"/>
+        <a:buChar char="•"/>
         <a:defRPr sz="2000" kern="1200">
           <a:solidFill>
             <a:schemeClr val="tx1"/>
@@ -323,7 +2784,7 @@
           <a:spcPct val="20000"/>
         </a:spcBef>
         <a:buFont typeface="Arial" pitchFamily="34" charset="0"/>
-        <a:buChar char="?"/>
+        <a:buChar char="•"/>
         <a:defRPr sz="2000" kern="1200">
           <a:solidFill>
             <a:schemeClr val="tx1"/>
@@ -459,7 +2920,7 @@
           <p:nvPr/>
         </p:nvPicPr>
         <p:blipFill>
-          <a:blip r:embed="rId1" cstate="print"/>
+          <a:blip r:embed="rId1"/>
           <a:srcRect l="0" r="0" t="0" b="0"/>
           <a:stretch/>
         </p:blipFill>
@@ -500,14 +2961,14 @@
       </p:grpSpPr>
       <p:pic>
         <p:nvPicPr>
-          <p:cNvPr id="2" name="Object 1" descr="/tmp/-LSImaTNKDuHoN6-4o7p-HiRes.jpg">    </p:cNvPr>
+          <p:cNvPr id="2" name="Object 1" descr="/tmp/-LSImaTMDiKw1BZXtWFm-HiRes.jpg">    </p:cNvPr>
           <p:cNvPicPr>
             <a:picLocks noChangeAspect="1"/>
           </p:cNvPicPr>
           <p:nvPr/>
         </p:nvPicPr>
         <p:blipFill>
-          <a:blip r:embed="rId1" cstate="print"/>
+          <a:blip r:embed="rId1"/>
           <a:srcRect l="0" r="0" t="0" b="0"/>
           <a:stretch/>
         </p:blipFill>
@@ -548,14 +3009,14 @@
       </p:grpSpPr>
       <p:pic>
         <p:nvPicPr>
-          <p:cNvPr id="2" name="Object 1" descr="/tmp/-LSImaTOVvo1KKp7Cf0E-HiRes.jpg">    </p:cNvPr>
+          <p:cNvPr id="2" name="Object 1" descr="/tmp/-LSImaTNKDuHoN6-4o7p-HiRes.jpg">    </p:cNvPr>
           <p:cNvPicPr>
             <a:picLocks noChangeAspect="1"/>
           </p:cNvPicPr>
           <p:nvPr/>
         </p:nvPicPr>
         <p:blipFill>
-          <a:blip r:embed="rId1" cstate="print"/>
+          <a:blip r:embed="rId1"/>
           <a:srcRect l="0" r="0" t="0" b="0"/>
           <a:stretch/>
         </p:blipFill>
@@ -596,14 +3057,14 @@
       </p:grpSpPr>
       <p:pic>
         <p:nvPicPr>
-          <p:cNvPr id="2" name="Object 1" descr="/tmp/-LSImaTOVvo1KKp7Cf0F-HiRes.jpg">    </p:cNvPr>
+          <p:cNvPr id="2" name="Object 1" descr="/tmp/-LSImaTOVvo1KKp7Cf0E-HiRes.jpg">    </p:cNvPr>
           <p:cNvPicPr>
             <a:picLocks noChangeAspect="1"/>
           </p:cNvPicPr>
           <p:nvPr/>
         </p:nvPicPr>
         <p:blipFill>
-          <a:blip r:embed="rId1" cstate="print"/>
+          <a:blip r:embed="rId1"/>
           <a:srcRect l="0" r="0" t="0" b="0"/>
           <a:stretch/>
         </p:blipFill>
@@ -644,14 +3105,14 @@
       </p:grpSpPr>
       <p:pic>
         <p:nvPicPr>
-          <p:cNvPr id="2" name="Object 1" descr="/tmp/-LSImaTOVvo1KKp7Cf0G-HiRes.jpg">    </p:cNvPr>
+          <p:cNvPr id="2" name="Object 1" descr="/tmp/-LSImaTOVvo1KKp7Cf0F-HiRes.jpg">    </p:cNvPr>
           <p:cNvPicPr>
             <a:picLocks noChangeAspect="1"/>
           </p:cNvPicPr>
           <p:nvPr/>
         </p:nvPicPr>
         <p:blipFill>
-          <a:blip r:embed="rId1" cstate="print"/>
+          <a:blip r:embed="rId1"/>
           <a:srcRect l="0" r="0" t="0" b="0"/>
           <a:stretch/>
         </p:blipFill>
@@ -692,14 +3153,14 @@
       </p:grpSpPr>
       <p:pic>
         <p:nvPicPr>
-          <p:cNvPr id="2" name="Object 1" descr="/tmp/-LSImaTPRRmFT_aU5iq5-HiRes.jpg">    </p:cNvPr>
+          <p:cNvPr id="2" name="Object 1" descr="/tmp/-LSImaTOVvo1KKp7Cf0G-HiRes.jpg">    </p:cNvPr>
           <p:cNvPicPr>
             <a:picLocks noChangeAspect="1"/>
           </p:cNvPicPr>
           <p:nvPr/>
         </p:nvPicPr>
         <p:blipFill>
-          <a:blip r:embed="rId1" cstate="print"/>
+          <a:blip r:embed="rId1"/>
           <a:srcRect l="0" r="0" t="0" b="0"/>
           <a:stretch/>
         </p:blipFill>
@@ -740,14 +3201,14 @@
       </p:grpSpPr>
       <p:pic>
         <p:nvPicPr>
-          <p:cNvPr id="2" name="Object 1" descr="/tmp/-LSImaTQJ8rLy0sErYMx-HiRes.jpg">    </p:cNvPr>
+          <p:cNvPr id="2" name="Object 1" descr="/tmp/-LSImaTPRRmFT_aU5iq5-HiRes.jpg">    </p:cNvPr>
           <p:cNvPicPr>
             <a:picLocks noChangeAspect="1"/>
           </p:cNvPicPr>
           <p:nvPr/>
         </p:nvPicPr>
         <p:blipFill>
-          <a:blip r:embed="rId1" cstate="print"/>
+          <a:blip r:embed="rId1"/>
           <a:srcRect l="0" r="0" t="0" b="0"/>
           <a:stretch/>
         </p:blipFill>
@@ -788,14 +3249,14 @@
       </p:grpSpPr>
       <p:pic>
         <p:nvPicPr>
-          <p:cNvPr id="2" name="Object 1" descr="/tmp/-LSImaTR3Slf7eoqi2Sl-HiRes.jpg">    </p:cNvPr>
+          <p:cNvPr id="2" name="Object 1" descr="/tmp/-LSImaTQJ8rLy0sErYMx-HiRes.jpg">    </p:cNvPr>
           <p:cNvPicPr>
             <a:picLocks noChangeAspect="1"/>
           </p:cNvPicPr>
           <p:nvPr/>
         </p:nvPicPr>
         <p:blipFill>
-          <a:blip r:embed="rId1" cstate="print"/>
+          <a:blip r:embed="rId1"/>
           <a:srcRect l="0" r="0" t="0" b="0"/>
           <a:stretch/>
         </p:blipFill>
@@ -836,14 +3297,14 @@
       </p:grpSpPr>
       <p:pic>
         <p:nvPicPr>
-          <p:cNvPr id="2" name="Object 1" descr="/tmp/-LSImaTR3Slf7eoqi2Sm-HiRes.jpg">    </p:cNvPr>
+          <p:cNvPr id="2" name="Object 1" descr="/tmp/-LSImaTR3Slf7eoqi2Sl-HiRes.jpg">    </p:cNvPr>
           <p:cNvPicPr>
             <a:picLocks noChangeAspect="1"/>
           </p:cNvPicPr>
           <p:nvPr/>
         </p:nvPicPr>
         <p:blipFill>
-          <a:blip r:embed="rId1" cstate="print"/>
+          <a:blip r:embed="rId1"/>
           <a:srcRect l="0" r="0" t="0" b="0"/>
           <a:stretch/>
         </p:blipFill>
@@ -884,14 +3345,14 @@
       </p:grpSpPr>
       <p:pic>
         <p:nvPicPr>
-          <p:cNvPr id="2" name="Object 1" descr="/tmp/-LSImaTS9pRdCrRWFLdH-HiRes.jpg">    </p:cNvPr>
+          <p:cNvPr id="2" name="Object 1" descr="/tmp/-LSImaTR3Slf7eoqi2Sm-HiRes.jpg">    </p:cNvPr>
           <p:cNvPicPr>
             <a:picLocks noChangeAspect="1"/>
           </p:cNvPicPr>
           <p:nvPr/>
         </p:nvPicPr>
         <p:blipFill>
-          <a:blip r:embed="rId1" cstate="print"/>
+          <a:blip r:embed="rId1"/>
           <a:srcRect l="0" r="0" t="0" b="0"/>
           <a:stretch/>
         </p:blipFill>
@@ -932,14 +3393,14 @@
       </p:grpSpPr>
       <p:pic>
         <p:nvPicPr>
-          <p:cNvPr id="2" name="Object 1" descr="/tmp/-LSImaTTqv6hpKLD9CkF-HiRes.jpg">    </p:cNvPr>
+          <p:cNvPr id="2" name="Object 1" descr="/tmp/-LSImaTS9pRdCrRWFLdH-HiRes.jpg">    </p:cNvPr>
           <p:cNvPicPr>
             <a:picLocks noChangeAspect="1"/>
           </p:cNvPicPr>
           <p:nvPr/>
         </p:nvPicPr>
         <p:blipFill>
-          <a:blip r:embed="rId1" cstate="print"/>
+          <a:blip r:embed="rId1"/>
           <a:srcRect l="0" r="0" t="0" b="0"/>
           <a:stretch/>
         </p:blipFill>
@@ -987,7 +3448,7 @@
           <p:nvPr/>
         </p:nvPicPr>
         <p:blipFill>
-          <a:blip r:embed="rId1" cstate="print"/>
+          <a:blip r:embed="rId1"/>
           <a:srcRect l="0" r="0" t="0" b="0"/>
           <a:stretch/>
         </p:blipFill>
@@ -1028,14 +3489,14 @@
       </p:grpSpPr>
       <p:pic>
         <p:nvPicPr>
-          <p:cNvPr id="2" name="Object 1" descr="/tmp/-LSImaTTqv6hpKLD9CkG-HiRes.jpg">    </p:cNvPr>
+          <p:cNvPr id="2" name="Object 1" descr="/tmp/-LSImaTTqv6hpKLD9CkF-HiRes.jpg">    </p:cNvPr>
           <p:cNvPicPr>
             <a:picLocks noChangeAspect="1"/>
           </p:cNvPicPr>
           <p:nvPr/>
         </p:nvPicPr>
         <p:blipFill>
-          <a:blip r:embed="rId1" cstate="print"/>
+          <a:blip r:embed="rId1"/>
           <a:srcRect l="0" r="0" t="0" b="0"/>
           <a:stretch/>
         </p:blipFill>
@@ -1076,14 +3537,14 @@
       </p:grpSpPr>
       <p:pic>
         <p:nvPicPr>
-          <p:cNvPr id="2" name="Object 1" descr="/tmp/-LSImaTUJAfYH-X68QdU-HiRes.jpg">    </p:cNvPr>
+          <p:cNvPr id="2" name="Object 1" descr="/tmp/-LSImaTTqv6hpKLD9CkG-HiRes.jpg">    </p:cNvPr>
           <p:cNvPicPr>
             <a:picLocks noChangeAspect="1"/>
           </p:cNvPicPr>
           <p:nvPr/>
         </p:nvPicPr>
         <p:blipFill>
-          <a:blip r:embed="rId1" cstate="print"/>
+          <a:blip r:embed="rId1"/>
           <a:srcRect l="0" r="0" t="0" b="0"/>
           <a:stretch/>
         </p:blipFill>
@@ -1124,14 +3585,14 @@
       </p:grpSpPr>
       <p:pic>
         <p:nvPicPr>
-          <p:cNvPr id="2" name="Object 1" descr="/tmp/-LSImaTXT3FWUNllEB4R-HiRes.jpg">    </p:cNvPr>
+          <p:cNvPr id="2" name="Object 1" descr="/tmp/-LSImaTUJAfYH-X68QdU-HiRes.jpg">    </p:cNvPr>
           <p:cNvPicPr>
             <a:picLocks noChangeAspect="1"/>
           </p:cNvPicPr>
           <p:nvPr/>
         </p:nvPicPr>
         <p:blipFill>
-          <a:blip r:embed="rId1" cstate="print"/>
+          <a:blip r:embed="rId1"/>
           <a:srcRect l="0" r="0" t="0" b="0"/>
           <a:stretch/>
         </p:blipFill>
@@ -1172,14 +3633,14 @@
       </p:grpSpPr>
       <p:pic>
         <p:nvPicPr>
-          <p:cNvPr id="2" name="Object 1" descr="/tmp/-LSSMz70RsdJvcj-PS3Q-HiRes.jpg">    </p:cNvPr>
+          <p:cNvPr id="2" name="Object 1" descr="/tmp/-LSImaTXT3FWUNllEB4R-HiRes.jpg">    </p:cNvPr>
           <p:cNvPicPr>
             <a:picLocks noChangeAspect="1"/>
           </p:cNvPicPr>
           <p:nvPr/>
         </p:nvPicPr>
         <p:blipFill>
-          <a:blip r:embed="rId1" cstate="print"/>
+          <a:blip r:embed="rId1"/>
           <a:srcRect l="0" r="0" t="0" b="0"/>
           <a:stretch/>
         </p:blipFill>
@@ -1201,9 +3662,9 @@
 </p:sld>
 </file>
 
-<file path=ppt/slides/slide3.xml><?xml version="1.0" encoding="utf-8"?>
+<file path=ppt/slides/slide24.xml><?xml version="1.0" encoding="utf-8"?>
 <p:sld xmlns:a="http://schemas.openxmlformats.org/drawingml/2006/main" xmlns:r="http://schemas.openxmlformats.org/officeDocument/2006/relationships" xmlns:p="http://schemas.openxmlformats.org/presentationml/2006/main">
-  <p:cSld name="Slide 3">
+  <p:cSld name="Slide 24">
     <p:spTree>
       <p:nvGrpSpPr>
         <p:cNvPr id="1" name=""/>
@@ -1220,14 +3681,14 @@
       </p:grpSpPr>
       <p:pic>
         <p:nvPicPr>
-          <p:cNvPr id="2" name="Object 1" descr="/tmp/-LSImaTEio-OZUHc_q-V-HiRes.jpg">    </p:cNvPr>
+          <p:cNvPr id="2" name="Object 1" descr="/tmp/-LSSMz70RsdJvcj-PS3Q-HiRes.jpg">    </p:cNvPr>
           <p:cNvPicPr>
             <a:picLocks noChangeAspect="1"/>
           </p:cNvPicPr>
           <p:nvPr/>
         </p:nvPicPr>
         <p:blipFill>
-          <a:blip r:embed="rId1" cstate="print"/>
+          <a:blip r:embed="rId1"/>
           <a:srcRect l="0" r="0" t="0" b="0"/>
           <a:stretch/>
         </p:blipFill>
@@ -1249,9 +3710,9 @@
 </p:sld>
 </file>
 
-<file path=ppt/slides/slide4.xml><?xml version="1.0" encoding="utf-8"?>
+<file path=ppt/slides/slide3.xml><?xml version="1.0" encoding="utf-8"?>
 <p:sld xmlns:a="http://schemas.openxmlformats.org/drawingml/2006/main" xmlns:r="http://schemas.openxmlformats.org/officeDocument/2006/relationships" xmlns:p="http://schemas.openxmlformats.org/presentationml/2006/main">
-  <p:cSld name="Slide 4">
+  <p:cSld name="Slide 3">
     <p:spTree>
       <p:nvGrpSpPr>
         <p:cNvPr id="1" name=""/>
@@ -1268,14 +3729,14 @@
       </p:grpSpPr>
       <p:pic>
         <p:nvPicPr>
-          <p:cNvPr id="2" name="Object 1" descr="/tmp/-LSImaTEio-OZUHc_q-W-HiRes.jpg">    </p:cNvPr>
+          <p:cNvPr id="2" name="Object 1" descr="/tmp/-LSv8KbZYGfSCBq_0O35-HiRes.jpg">    </p:cNvPr>
           <p:cNvPicPr>
             <a:picLocks noChangeAspect="1"/>
           </p:cNvPicPr>
           <p:nvPr/>
         </p:nvPicPr>
         <p:blipFill>
-          <a:blip r:embed="rId1" cstate="print"/>
+          <a:blip r:embed="rId1"/>
           <a:srcRect l="0" r="0" t="0" b="0"/>
           <a:stretch/>
         </p:blipFill>
@@ -1297,9 +3758,9 @@
 </p:sld>
 </file>
 
-<file path=ppt/slides/slide5.xml><?xml version="1.0" encoding="utf-8"?>
+<file path=ppt/slides/slide4.xml><?xml version="1.0" encoding="utf-8"?>
 <p:sld xmlns:a="http://schemas.openxmlformats.org/drawingml/2006/main" xmlns:r="http://schemas.openxmlformats.org/officeDocument/2006/relationships" xmlns:p="http://schemas.openxmlformats.org/presentationml/2006/main">
-  <p:cSld name="Slide 5">
+  <p:cSld name="Slide 4">
     <p:spTree>
       <p:nvGrpSpPr>
         <p:cNvPr id="1" name=""/>
@@ -1316,14 +3777,14 @@
       </p:grpSpPr>
       <p:pic>
         <p:nvPicPr>
-          <p:cNvPr id="2" name="Object 1" descr="/tmp/-LSIofqtnR1apaxQz1PI-HiRes.jpg">    </p:cNvPr>
+          <p:cNvPr id="2" name="Object 1" descr="/tmp/-LSImaTEio-OZUHc_q-V-HiRes.jpg">    </p:cNvPr>
           <p:cNvPicPr>
             <a:picLocks noChangeAspect="1"/>
           </p:cNvPicPr>
           <p:nvPr/>
         </p:nvPicPr>
         <p:blipFill>
-          <a:blip r:embed="rId1" cstate="print"/>
+          <a:blip r:embed="rId1"/>
           <a:srcRect l="0" r="0" t="0" b="0"/>
           <a:stretch/>
         </p:blipFill>
@@ -1345,9 +3806,9 @@
 </p:sld>
 </file>
 
-<file path=ppt/slides/slide6.xml><?xml version="1.0" encoding="utf-8"?>
+<file path=ppt/slides/slide5.xml><?xml version="1.0" encoding="utf-8"?>
 <p:sld xmlns:a="http://schemas.openxmlformats.org/drawingml/2006/main" xmlns:r="http://schemas.openxmlformats.org/officeDocument/2006/relationships" xmlns:p="http://schemas.openxmlformats.org/presentationml/2006/main">
-  <p:cSld name="Slide 6">
+  <p:cSld name="Slide 5">
     <p:spTree>
       <p:nvGrpSpPr>
         <p:cNvPr id="1" name=""/>
@@ -1364,14 +3825,14 @@
       </p:grpSpPr>
       <p:pic>
         <p:nvPicPr>
-          <p:cNvPr id="2" name="Object 1" descr="/tmp/-LSImaTJfifiOpS0FXhL-HiRes.jpg">    </p:cNvPr>
+          <p:cNvPr id="2" name="Object 1" descr="/tmp/-LSImaTEio-OZUHc_q-W-HiRes.jpg">    </p:cNvPr>
           <p:cNvPicPr>
             <a:picLocks noChangeAspect="1"/>
           </p:cNvPicPr>
           <p:nvPr/>
         </p:nvPicPr>
         <p:blipFill>
-          <a:blip r:embed="rId1" cstate="print"/>
+          <a:blip r:embed="rId1"/>
           <a:srcRect l="0" r="0" t="0" b="0"/>
           <a:stretch/>
         </p:blipFill>
@@ -1393,9 +3854,9 @@
 </p:sld>
 </file>
 
-<file path=ppt/slides/slide7.xml><?xml version="1.0" encoding="utf-8"?>
+<file path=ppt/slides/slide6.xml><?xml version="1.0" encoding="utf-8"?>
 <p:sld xmlns:a="http://schemas.openxmlformats.org/drawingml/2006/main" xmlns:r="http://schemas.openxmlformats.org/officeDocument/2006/relationships" xmlns:p="http://schemas.openxmlformats.org/presentationml/2006/main">
-  <p:cSld name="Slide 7">
+  <p:cSld name="Slide 6">
     <p:spTree>
       <p:nvGrpSpPr>
         <p:cNvPr id="1" name=""/>
@@ -1412,14 +3873,14 @@
       </p:grpSpPr>
       <p:pic>
         <p:nvPicPr>
-          <p:cNvPr id="2" name="Object 1" descr="/tmp/-LSImaTLhiANe87FUzpR-HiRes.jpg">    </p:cNvPr>
+          <p:cNvPr id="2" name="Object 1" descr="/tmp/-LSIofqtnR1apaxQz1PI-HiRes.jpg">    </p:cNvPr>
           <p:cNvPicPr>
             <a:picLocks noChangeAspect="1"/>
           </p:cNvPicPr>
           <p:nvPr/>
         </p:nvPicPr>
         <p:blipFill>
-          <a:blip r:embed="rId1" cstate="print"/>
+          <a:blip r:embed="rId1"/>
           <a:srcRect l="0" r="0" t="0" b="0"/>
           <a:stretch/>
         </p:blipFill>
@@ -1441,9 +3902,9 @@
 </p:sld>
 </file>
 
-<file path=ppt/slides/slide8.xml><?xml version="1.0" encoding="utf-8"?>
+<file path=ppt/slides/slide7.xml><?xml version="1.0" encoding="utf-8"?>
 <p:sld xmlns:a="http://schemas.openxmlformats.org/drawingml/2006/main" xmlns:r="http://schemas.openxmlformats.org/officeDocument/2006/relationships" xmlns:p="http://schemas.openxmlformats.org/presentationml/2006/main">
-  <p:cSld name="Slide 8">
+  <p:cSld name="Slide 7">
     <p:spTree>
       <p:nvGrpSpPr>
         <p:cNvPr id="1" name=""/>
@@ -1460,14 +3921,14 @@
       </p:grpSpPr>
       <p:pic>
         <p:nvPicPr>
-          <p:cNvPr id="2" name="Object 1" descr="/tmp/-LSImaTLhiANe87FUzpS-HiRes.jpg">    </p:cNvPr>
+          <p:cNvPr id="2" name="Object 1" descr="/tmp/-LSImaTJfifiOpS0FXhL-HiRes.jpg">    </p:cNvPr>
           <p:cNvPicPr>
             <a:picLocks noChangeAspect="1"/>
           </p:cNvPicPr>
           <p:nvPr/>
         </p:nvPicPr>
         <p:blipFill>
-          <a:blip r:embed="rId1" cstate="print"/>
+          <a:blip r:embed="rId1"/>
           <a:srcRect l="0" r="0" t="0" b="0"/>
           <a:stretch/>
         </p:blipFill>
@@ -1489,9 +3950,9 @@
 </p:sld>
 </file>
 
-<file path=ppt/slides/slide9.xml><?xml version="1.0" encoding="utf-8"?>
+<file path=ppt/slides/slide8.xml><?xml version="1.0" encoding="utf-8"?>
 <p:sld xmlns:a="http://schemas.openxmlformats.org/drawingml/2006/main" xmlns:r="http://schemas.openxmlformats.org/officeDocument/2006/relationships" xmlns:p="http://schemas.openxmlformats.org/presentationml/2006/main">
-  <p:cSld name="Slide 9">
+  <p:cSld name="Slide 8">
     <p:spTree>
       <p:nvGrpSpPr>
         <p:cNvPr id="1" name=""/>
@@ -1508,14 +3969,14 @@
       </p:grpSpPr>
       <p:pic>
         <p:nvPicPr>
-          <p:cNvPr id="2" name="Object 1" descr="/tmp/-LSImaTMDiKw1BZXtWFm-HiRes.jpg">    </p:cNvPr>
+          <p:cNvPr id="2" name="Object 1" descr="/tmp/-LSImaTLhiANe87FUzpR-HiRes.jpg">    </p:cNvPr>
           <p:cNvPicPr>
             <a:picLocks noChangeAspect="1"/>
           </p:cNvPicPr>
           <p:nvPr/>
         </p:nvPicPr>
         <p:blipFill>
-          <a:blip r:embed="rId1" cstate="print"/>
+          <a:blip r:embed="rId1"/>
           <a:srcRect l="0" r="0" t="0" b="0"/>
           <a:stretch/>
         </p:blipFill>
@@ -1537,8 +3998,56 @@
 </p:sld>
 </file>
 
+<file path=ppt/slides/slide9.xml><?xml version="1.0" encoding="utf-8"?>
+<p:sld xmlns:a="http://schemas.openxmlformats.org/drawingml/2006/main" xmlns:r="http://schemas.openxmlformats.org/officeDocument/2006/relationships" xmlns:p="http://schemas.openxmlformats.org/presentationml/2006/main">
+  <p:cSld name="Slide 9">
+    <p:spTree>
+      <p:nvGrpSpPr>
+        <p:cNvPr id="1" name=""/>
+        <p:cNvGrpSpPr/>
+        <p:nvPr/>
+      </p:nvGrpSpPr>
+      <p:grpSpPr>
+        <a:xfrm>
+          <a:off x="0" y="0"/>
+          <a:ext cx="0" cy="0"/>
+          <a:chOff x="0" y="0"/>
+          <a:chExt cx="0" cy="0"/>
+        </a:xfrm>
+      </p:grpSpPr>
+      <p:pic>
+        <p:nvPicPr>
+          <p:cNvPr id="2" name="Object 1" descr="/tmp/-LSImaTLhiANe87FUzpS-HiRes.jpg">    </p:cNvPr>
+          <p:cNvPicPr>
+            <a:picLocks noChangeAspect="1"/>
+          </p:cNvPicPr>
+          <p:nvPr/>
+        </p:nvPicPr>
+        <p:blipFill>
+          <a:blip r:embed="rId1"/>
+          <a:srcRect l="0" r="0" t="0" b="0"/>
+          <a:stretch/>
+        </p:blipFill>
+        <p:spPr>
+          <a:xfrm>
+            <a:off x="0" y="0"/>
+            <a:ext cx="9144000" cy="5143500"/>
+          </a:xfrm>
+          <a:prstGeom prst="rect">
+            <a:avLst/>
+          </a:prstGeom>
+        </p:spPr>
+      </p:pic>
+    </p:spTree>
+  </p:cSld>
+  <p:clrMapOvr>
+    <a:masterClrMapping/>
+  </p:clrMapOvr>
+</p:sld>
+</file>
+
 <file path=ppt/theme/theme1.xml><?xml version="1.0" encoding="utf-8"?>
-<a:theme xmlns:a="http://schemas.openxmlformats.org/drawingml/2006/main" xmlns:r="http://schemas.openxmlformats.org/officeDocument/2006/relationships" name="Office Theme">
+<a:theme xmlns:a="http://schemas.openxmlformats.org/drawingml/2006/main" name="Office Theme">
   <a:themeElements>
     <a:clrScheme name="Office">
       <a:dk1>
@@ -1581,12 +4090,12 @@
     <a:fontScheme name="Office">
       <a:majorFont>
         <a:latin typeface="Arial"/>
-        <a:ea typeface="Arial"/>
-        <a:cs typeface="Arial"/>
-        <a:font script="Jpan" typeface="MS P????"/>
-        <a:font script="Hang" typeface="?? ??"/>
-        <a:font script="Hans" typeface="??"/>
-        <a:font script="Hant" typeface="????"/>
+        <a:ea typeface=""/>
+        <a:cs typeface=""/>
+        <a:font script="Jpan" typeface="Yu Gothic Light"/>
+        <a:font script="Hang" typeface="맑은 고딕"/>
+        <a:font script="Hans" typeface="DengXian Light"/>
+        <a:font script="Hant" typeface="新細明體"/>
         <a:font script="Arab" typeface="Times New Roman"/>
         <a:font script="Hebr" typeface="Times New Roman"/>
         <a:font script="Thai" typeface="Angsana New"/>
@@ -1615,12 +4124,12 @@
       </a:majorFont>
       <a:minorFont>
         <a:latin typeface="Arial"/>
-        <a:ea typeface="Arial"/>
-        <a:cs typeface="Arial"/>
-        <a:font script="Jpan" typeface="MS P????"/>
-        <a:font script="Hang" typeface="?? ??"/>
-        <a:font script="Hans" typeface="??"/>
-        <a:font script="Hant" typeface="????"/>
+        <a:ea typeface=""/>
+        <a:cs typeface=""/>
+        <a:font script="Jpan" typeface="Yu Gothic"/>
+        <a:font script="Hang" typeface="맑은 고딕"/>
+        <a:font script="Hans" typeface="DengXian"/>
+        <a:font script="Hant" typeface="新細明體"/>
         <a:font script="Arab" typeface="Arial"/>
         <a:font script="Hebr" typeface="Arial"/>
         <a:font script="Thai" typeface="Cordia New"/>

</xml_diff>